<commit_message>
MaJ suite point de synchro de mercredi
</commit_message>
<xml_diff>
--- a/Jour1/01 Introduction/Introduction.pptx
+++ b/Jour1/01 Introduction/Introduction.pptx
@@ -5,10 +5,10 @@
     <p:sldMasterId id="2147483648" r:id="rId1"/>
   </p:sldMasterIdLst>
   <p:notesMasterIdLst>
-    <p:notesMasterId r:id="rId30"/>
+    <p:notesMasterId r:id="rId29"/>
   </p:notesMasterIdLst>
   <p:handoutMasterIdLst>
-    <p:handoutMasterId r:id="rId31"/>
+    <p:handoutMasterId r:id="rId30"/>
   </p:handoutMasterIdLst>
   <p:sldIdLst>
     <p:sldId id="534" r:id="rId2"/>
@@ -33,12 +33,11 @@
     <p:sldId id="551" r:id="rId21"/>
     <p:sldId id="552" r:id="rId22"/>
     <p:sldId id="553" r:id="rId23"/>
-    <p:sldId id="555" r:id="rId24"/>
-    <p:sldId id="556" r:id="rId25"/>
-    <p:sldId id="557" r:id="rId26"/>
-    <p:sldId id="574" r:id="rId27"/>
-    <p:sldId id="558" r:id="rId28"/>
-    <p:sldId id="575" r:id="rId29"/>
+    <p:sldId id="558" r:id="rId24"/>
+    <p:sldId id="555" r:id="rId25"/>
+    <p:sldId id="556" r:id="rId26"/>
+    <p:sldId id="557" r:id="rId27"/>
+    <p:sldId id="575" r:id="rId28"/>
   </p:sldIdLst>
   <p:sldSz cx="9144000" cy="6858000" type="screen4x3"/>
   <p:notesSz cx="7104063" cy="10234613"/>
@@ -1503,6 +1502,688 @@
       <dsp:cNvGrpSpPr/>
     </dsp:nvGrpSpPr>
     <dsp:grpSpPr/>
+    <dsp:sp modelId="{238DF370-80EC-49DD-8516-6A1724E927B8}">
+      <dsp:nvSpPr>
+        <dsp:cNvPr id="0" name=""/>
+        <dsp:cNvSpPr/>
+      </dsp:nvSpPr>
+      <dsp:spPr>
+        <a:xfrm>
+          <a:off x="151839" y="1043733"/>
+          <a:ext cx="387917" cy="387917"/>
+        </a:xfrm>
+        <a:prstGeom prst="donut">
+          <a:avLst>
+            <a:gd name="adj" fmla="val 20000"/>
+          </a:avLst>
+        </a:prstGeom>
+        <a:solidFill>
+          <a:schemeClr val="accent1">
+            <a:hueOff val="0"/>
+            <a:satOff val="0"/>
+            <a:lumOff val="0"/>
+            <a:alphaOff val="0"/>
+          </a:schemeClr>
+        </a:solidFill>
+        <a:ln w="25400" cap="flat" cmpd="sng" algn="ctr">
+          <a:solidFill>
+            <a:schemeClr val="lt1">
+              <a:hueOff val="0"/>
+              <a:satOff val="0"/>
+              <a:lumOff val="0"/>
+              <a:alphaOff val="0"/>
+            </a:schemeClr>
+          </a:solidFill>
+          <a:prstDash val="solid"/>
+        </a:ln>
+        <a:effectLst/>
+      </dsp:spPr>
+      <dsp:style>
+        <a:lnRef idx="2">
+          <a:scrgbClr r="0" g="0" b="0"/>
+        </a:lnRef>
+        <a:fillRef idx="1">
+          <a:scrgbClr r="0" g="0" b="0"/>
+        </a:fillRef>
+        <a:effectRef idx="0">
+          <a:scrgbClr r="0" g="0" b="0"/>
+        </a:effectRef>
+        <a:fontRef idx="minor">
+          <a:schemeClr val="lt1"/>
+        </a:fontRef>
+      </dsp:style>
+    </dsp:sp>
+    <dsp:sp modelId="{1D96FCE4-59C2-4680-B9DE-0B6340D9FA38}">
+      <dsp:nvSpPr>
+        <dsp:cNvPr id="0" name=""/>
+        <dsp:cNvSpPr/>
+      </dsp:nvSpPr>
+      <dsp:spPr>
+        <a:xfrm rot="17700000">
+          <a:off x="243977" y="330687"/>
+          <a:ext cx="857287" cy="413146"/>
+        </a:xfrm>
+        <a:prstGeom prst="rect">
+          <a:avLst/>
+        </a:prstGeom>
+        <a:noFill/>
+        <a:ln>
+          <a:noFill/>
+        </a:ln>
+        <a:effectLst/>
+      </dsp:spPr>
+      <dsp:style>
+        <a:lnRef idx="0">
+          <a:scrgbClr r="0" g="0" b="0"/>
+        </a:lnRef>
+        <a:fillRef idx="0">
+          <a:scrgbClr r="0" g="0" b="0"/>
+        </a:fillRef>
+        <a:effectRef idx="0">
+          <a:scrgbClr r="0" g="0" b="0"/>
+        </a:effectRef>
+        <a:fontRef idx="minor"/>
+      </dsp:style>
+      <dsp:txBody>
+        <a:bodyPr spcFirstLastPara="0" vert="horz" wrap="square" lIns="22860" tIns="0" rIns="0" bIns="0" numCol="1" spcCol="1270" anchor="ctr" anchorCtr="0">
+          <a:noAutofit/>
+        </a:bodyPr>
+        <a:lstStyle/>
+        <a:p>
+          <a:pPr lvl="0" algn="l" defTabSz="400050">
+            <a:lnSpc>
+              <a:spcPct val="90000"/>
+            </a:lnSpc>
+            <a:spcBef>
+              <a:spcPct val="0"/>
+            </a:spcBef>
+            <a:spcAft>
+              <a:spcPct val="35000"/>
+            </a:spcAft>
+          </a:pPr>
+          <a:r>
+            <a:rPr lang="fr-FR" sz="900" kern="1200" dirty="0"/>
+            <a:t>mars 1996</a:t>
+          </a:r>
+        </a:p>
+      </dsp:txBody>
+      <dsp:txXfrm>
+        <a:off x="243977" y="330687"/>
+        <a:ext cx="857287" cy="413146"/>
+      </dsp:txXfrm>
+    </dsp:sp>
+    <dsp:sp modelId="{108974EB-7EA9-4E97-9289-B3949C4A74E3}">
+      <dsp:nvSpPr>
+        <dsp:cNvPr id="0" name=""/>
+        <dsp:cNvSpPr/>
+      </dsp:nvSpPr>
+      <dsp:spPr>
+        <a:xfrm>
+          <a:off x="886291" y="1036554"/>
+          <a:ext cx="402275" cy="402275"/>
+        </a:xfrm>
+        <a:prstGeom prst="donut">
+          <a:avLst>
+            <a:gd name="adj" fmla="val 20000"/>
+          </a:avLst>
+        </a:prstGeom>
+        <a:solidFill>
+          <a:schemeClr val="accent1">
+            <a:hueOff val="0"/>
+            <a:satOff val="0"/>
+            <a:lumOff val="0"/>
+            <a:alphaOff val="0"/>
+          </a:schemeClr>
+        </a:solidFill>
+        <a:ln w="25400" cap="flat" cmpd="sng" algn="ctr">
+          <a:solidFill>
+            <a:schemeClr val="lt1">
+              <a:hueOff val="0"/>
+              <a:satOff val="0"/>
+              <a:lumOff val="0"/>
+              <a:alphaOff val="0"/>
+            </a:schemeClr>
+          </a:solidFill>
+          <a:prstDash val="solid"/>
+        </a:ln>
+        <a:effectLst/>
+      </dsp:spPr>
+      <dsp:style>
+        <a:lnRef idx="2">
+          <a:scrgbClr r="0" g="0" b="0"/>
+        </a:lnRef>
+        <a:fillRef idx="1">
+          <a:scrgbClr r="0" g="0" b="0"/>
+        </a:fillRef>
+        <a:effectRef idx="0">
+          <a:scrgbClr r="0" g="0" b="0"/>
+        </a:effectRef>
+        <a:fontRef idx="minor">
+          <a:schemeClr val="lt1"/>
+        </a:fontRef>
+      </dsp:style>
+    </dsp:sp>
+    <dsp:sp modelId="{4CD037A6-1859-44BF-A97B-CF6D98E30C97}">
+      <dsp:nvSpPr>
+        <dsp:cNvPr id="0" name=""/>
+        <dsp:cNvSpPr/>
+      </dsp:nvSpPr>
+      <dsp:spPr>
+        <a:xfrm rot="17700000">
+          <a:off x="985608" y="330687"/>
+          <a:ext cx="857287" cy="413146"/>
+        </a:xfrm>
+        <a:prstGeom prst="rect">
+          <a:avLst/>
+        </a:prstGeom>
+        <a:noFill/>
+        <a:ln>
+          <a:noFill/>
+        </a:ln>
+        <a:effectLst/>
+      </dsp:spPr>
+      <dsp:style>
+        <a:lnRef idx="0">
+          <a:scrgbClr r="0" g="0" b="0"/>
+        </a:lnRef>
+        <a:fillRef idx="0">
+          <a:scrgbClr r="0" g="0" b="0"/>
+        </a:fillRef>
+        <a:effectRef idx="0">
+          <a:scrgbClr r="0" g="0" b="0"/>
+        </a:effectRef>
+        <a:fontRef idx="minor"/>
+      </dsp:style>
+      <dsp:txBody>
+        <a:bodyPr spcFirstLastPara="0" vert="horz" wrap="square" lIns="22860" tIns="0" rIns="0" bIns="0" numCol="1" spcCol="1270" anchor="ctr" anchorCtr="0">
+          <a:noAutofit/>
+        </a:bodyPr>
+        <a:lstStyle/>
+        <a:p>
+          <a:pPr lvl="0" algn="l" defTabSz="400050">
+            <a:lnSpc>
+              <a:spcPct val="90000"/>
+            </a:lnSpc>
+            <a:spcBef>
+              <a:spcPct val="0"/>
+            </a:spcBef>
+            <a:spcAft>
+              <a:spcPct val="35000"/>
+            </a:spcAft>
+          </a:pPr>
+          <a:r>
+            <a:rPr lang="fr-FR" sz="900" kern="1200" dirty="0"/>
+            <a:t>ES2-oct-1998</a:t>
+          </a:r>
+        </a:p>
+        <a:p>
+          <a:pPr lvl="0" algn="l" defTabSz="400050">
+            <a:lnSpc>
+              <a:spcPct val="90000"/>
+            </a:lnSpc>
+            <a:spcBef>
+              <a:spcPct val="0"/>
+            </a:spcBef>
+            <a:spcAft>
+              <a:spcPct val="35000"/>
+            </a:spcAft>
+          </a:pPr>
+          <a:endParaRPr lang="fr-FR" sz="900" kern="1200" dirty="0"/>
+        </a:p>
+      </dsp:txBody>
+      <dsp:txXfrm>
+        <a:off x="985608" y="330687"/>
+        <a:ext cx="857287" cy="413146"/>
+      </dsp:txXfrm>
+    </dsp:sp>
+    <dsp:sp modelId="{3FBE4088-F4D0-40B7-AE1D-DD8AFF0CB91B}">
+      <dsp:nvSpPr>
+        <dsp:cNvPr id="0" name=""/>
+        <dsp:cNvSpPr/>
+      </dsp:nvSpPr>
+      <dsp:spPr>
+        <a:xfrm>
+          <a:off x="1627922" y="1036554"/>
+          <a:ext cx="402275" cy="402275"/>
+        </a:xfrm>
+        <a:prstGeom prst="donut">
+          <a:avLst>
+            <a:gd name="adj" fmla="val 20000"/>
+          </a:avLst>
+        </a:prstGeom>
+        <a:solidFill>
+          <a:schemeClr val="accent1">
+            <a:hueOff val="0"/>
+            <a:satOff val="0"/>
+            <a:lumOff val="0"/>
+            <a:alphaOff val="0"/>
+          </a:schemeClr>
+        </a:solidFill>
+        <a:ln w="25400" cap="flat" cmpd="sng" algn="ctr">
+          <a:solidFill>
+            <a:schemeClr val="lt1">
+              <a:hueOff val="0"/>
+              <a:satOff val="0"/>
+              <a:lumOff val="0"/>
+              <a:alphaOff val="0"/>
+            </a:schemeClr>
+          </a:solidFill>
+          <a:prstDash val="solid"/>
+        </a:ln>
+        <a:effectLst/>
+      </dsp:spPr>
+      <dsp:style>
+        <a:lnRef idx="2">
+          <a:scrgbClr r="0" g="0" b="0"/>
+        </a:lnRef>
+        <a:fillRef idx="1">
+          <a:scrgbClr r="0" g="0" b="0"/>
+        </a:fillRef>
+        <a:effectRef idx="0">
+          <a:scrgbClr r="0" g="0" b="0"/>
+        </a:effectRef>
+        <a:fontRef idx="minor">
+          <a:schemeClr val="lt1"/>
+        </a:fontRef>
+      </dsp:style>
+    </dsp:sp>
+    <dsp:sp modelId="{0B669F0F-24DF-4F2E-BF58-582DE7A36AA5}">
+      <dsp:nvSpPr>
+        <dsp:cNvPr id="0" name=""/>
+        <dsp:cNvSpPr/>
+      </dsp:nvSpPr>
+      <dsp:spPr>
+        <a:xfrm rot="17700000">
+          <a:off x="1727239" y="330687"/>
+          <a:ext cx="857287" cy="413146"/>
+        </a:xfrm>
+        <a:prstGeom prst="rect">
+          <a:avLst/>
+        </a:prstGeom>
+        <a:noFill/>
+        <a:ln>
+          <a:noFill/>
+        </a:ln>
+        <a:effectLst/>
+      </dsp:spPr>
+      <dsp:style>
+        <a:lnRef idx="0">
+          <a:scrgbClr r="0" g="0" b="0"/>
+        </a:lnRef>
+        <a:fillRef idx="0">
+          <a:scrgbClr r="0" g="0" b="0"/>
+        </a:fillRef>
+        <a:effectRef idx="0">
+          <a:scrgbClr r="0" g="0" b="0"/>
+        </a:effectRef>
+        <a:fontRef idx="minor"/>
+      </dsp:style>
+      <dsp:txBody>
+        <a:bodyPr spcFirstLastPara="0" vert="horz" wrap="square" lIns="22860" tIns="0" rIns="0" bIns="0" numCol="1" spcCol="1270" anchor="ctr" anchorCtr="0">
+          <a:noAutofit/>
+        </a:bodyPr>
+        <a:lstStyle/>
+        <a:p>
+          <a:pPr lvl="0" algn="l" defTabSz="400050">
+            <a:lnSpc>
+              <a:spcPct val="90000"/>
+            </a:lnSpc>
+            <a:spcBef>
+              <a:spcPct val="0"/>
+            </a:spcBef>
+            <a:spcAft>
+              <a:spcPct val="35000"/>
+            </a:spcAft>
+          </a:pPr>
+          <a:r>
+            <a:rPr lang="fr-FR" sz="900" kern="1200" dirty="0"/>
+            <a:t>ES3-nov-2000</a:t>
+          </a:r>
+        </a:p>
+      </dsp:txBody>
+      <dsp:txXfrm>
+        <a:off x="1727239" y="330687"/>
+        <a:ext cx="857287" cy="413146"/>
+      </dsp:txXfrm>
+    </dsp:sp>
+    <dsp:sp modelId="{3268F5D7-03A4-404B-9070-27A2517220C4}">
+      <dsp:nvSpPr>
+        <dsp:cNvPr id="0" name=""/>
+        <dsp:cNvSpPr/>
+      </dsp:nvSpPr>
+      <dsp:spPr>
+        <a:xfrm>
+          <a:off x="2369553" y="1036554"/>
+          <a:ext cx="402275" cy="402275"/>
+        </a:xfrm>
+        <a:prstGeom prst="donut">
+          <a:avLst>
+            <a:gd name="adj" fmla="val 20000"/>
+          </a:avLst>
+        </a:prstGeom>
+        <a:solidFill>
+          <a:schemeClr val="accent1">
+            <a:hueOff val="0"/>
+            <a:satOff val="0"/>
+            <a:lumOff val="0"/>
+            <a:alphaOff val="0"/>
+          </a:schemeClr>
+        </a:solidFill>
+        <a:ln w="25400" cap="flat" cmpd="sng" algn="ctr">
+          <a:solidFill>
+            <a:schemeClr val="lt1">
+              <a:hueOff val="0"/>
+              <a:satOff val="0"/>
+              <a:lumOff val="0"/>
+              <a:alphaOff val="0"/>
+            </a:schemeClr>
+          </a:solidFill>
+          <a:prstDash val="solid"/>
+        </a:ln>
+        <a:effectLst/>
+      </dsp:spPr>
+      <dsp:style>
+        <a:lnRef idx="2">
+          <a:scrgbClr r="0" g="0" b="0"/>
+        </a:lnRef>
+        <a:fillRef idx="1">
+          <a:scrgbClr r="0" g="0" b="0"/>
+        </a:fillRef>
+        <a:effectRef idx="0">
+          <a:scrgbClr r="0" g="0" b="0"/>
+        </a:effectRef>
+        <a:fontRef idx="minor">
+          <a:schemeClr val="lt1"/>
+        </a:fontRef>
+      </dsp:style>
+    </dsp:sp>
+    <dsp:sp modelId="{E1B8D6AF-12E3-4B09-8E20-5FA28E8BDDE1}">
+      <dsp:nvSpPr>
+        <dsp:cNvPr id="0" name=""/>
+        <dsp:cNvSpPr/>
+      </dsp:nvSpPr>
+      <dsp:spPr>
+        <a:xfrm rot="17700000">
+          <a:off x="2468870" y="330687"/>
+          <a:ext cx="857287" cy="413146"/>
+        </a:xfrm>
+        <a:prstGeom prst="rect">
+          <a:avLst/>
+        </a:prstGeom>
+        <a:noFill/>
+        <a:ln>
+          <a:noFill/>
+        </a:ln>
+        <a:effectLst/>
+      </dsp:spPr>
+      <dsp:style>
+        <a:lnRef idx="0">
+          <a:scrgbClr r="0" g="0" b="0"/>
+        </a:lnRef>
+        <a:fillRef idx="0">
+          <a:scrgbClr r="0" g="0" b="0"/>
+        </a:fillRef>
+        <a:effectRef idx="0">
+          <a:scrgbClr r="0" g="0" b="0"/>
+        </a:effectRef>
+        <a:fontRef idx="minor"/>
+      </dsp:style>
+      <dsp:txBody>
+        <a:bodyPr spcFirstLastPara="0" vert="horz" wrap="square" lIns="22860" tIns="0" rIns="0" bIns="0" numCol="1" spcCol="1270" anchor="ctr" anchorCtr="0">
+          <a:noAutofit/>
+        </a:bodyPr>
+        <a:lstStyle/>
+        <a:p>
+          <a:pPr lvl="0" algn="l" defTabSz="400050">
+            <a:lnSpc>
+              <a:spcPct val="90000"/>
+            </a:lnSpc>
+            <a:spcBef>
+              <a:spcPct val="0"/>
+            </a:spcBef>
+            <a:spcAft>
+              <a:spcPct val="35000"/>
+            </a:spcAft>
+          </a:pPr>
+          <a:r>
+            <a:rPr lang="fr-FR" sz="900" kern="1200" dirty="0"/>
+            <a:t>ES5-dec-2009</a:t>
+          </a:r>
+        </a:p>
+      </dsp:txBody>
+      <dsp:txXfrm>
+        <a:off x="2468870" y="330687"/>
+        <a:ext cx="857287" cy="413146"/>
+      </dsp:txXfrm>
+    </dsp:sp>
+    <dsp:sp modelId="{BC335834-293B-496A-85EF-D0C322DE9E56}">
+      <dsp:nvSpPr>
+        <dsp:cNvPr id="0" name=""/>
+        <dsp:cNvSpPr/>
+      </dsp:nvSpPr>
+      <dsp:spPr>
+        <a:xfrm>
+          <a:off x="3111184" y="1036554"/>
+          <a:ext cx="402275" cy="402275"/>
+        </a:xfrm>
+        <a:prstGeom prst="donut">
+          <a:avLst>
+            <a:gd name="adj" fmla="val 20000"/>
+          </a:avLst>
+        </a:prstGeom>
+        <a:solidFill>
+          <a:schemeClr val="accent1">
+            <a:hueOff val="0"/>
+            <a:satOff val="0"/>
+            <a:lumOff val="0"/>
+            <a:alphaOff val="0"/>
+          </a:schemeClr>
+        </a:solidFill>
+        <a:ln w="25400" cap="flat" cmpd="sng" algn="ctr">
+          <a:solidFill>
+            <a:schemeClr val="lt1">
+              <a:hueOff val="0"/>
+              <a:satOff val="0"/>
+              <a:lumOff val="0"/>
+              <a:alphaOff val="0"/>
+            </a:schemeClr>
+          </a:solidFill>
+          <a:prstDash val="solid"/>
+        </a:ln>
+        <a:effectLst/>
+      </dsp:spPr>
+      <dsp:style>
+        <a:lnRef idx="2">
+          <a:scrgbClr r="0" g="0" b="0"/>
+        </a:lnRef>
+        <a:fillRef idx="1">
+          <a:scrgbClr r="0" g="0" b="0"/>
+        </a:fillRef>
+        <a:effectRef idx="0">
+          <a:scrgbClr r="0" g="0" b="0"/>
+        </a:effectRef>
+        <a:fontRef idx="minor">
+          <a:schemeClr val="lt1"/>
+        </a:fontRef>
+      </dsp:style>
+    </dsp:sp>
+    <dsp:sp modelId="{78D33A8E-1000-4DE5-9129-77C6B18F4185}">
+      <dsp:nvSpPr>
+        <dsp:cNvPr id="0" name=""/>
+        <dsp:cNvSpPr/>
+      </dsp:nvSpPr>
+      <dsp:spPr>
+        <a:xfrm rot="17700000">
+          <a:off x="3210501" y="330687"/>
+          <a:ext cx="857287" cy="413146"/>
+        </a:xfrm>
+        <a:prstGeom prst="rect">
+          <a:avLst/>
+        </a:prstGeom>
+        <a:noFill/>
+        <a:ln>
+          <a:noFill/>
+        </a:ln>
+        <a:effectLst/>
+      </dsp:spPr>
+      <dsp:style>
+        <a:lnRef idx="0">
+          <a:scrgbClr r="0" g="0" b="0"/>
+        </a:lnRef>
+        <a:fillRef idx="0">
+          <a:scrgbClr r="0" g="0" b="0"/>
+        </a:fillRef>
+        <a:effectRef idx="0">
+          <a:scrgbClr r="0" g="0" b="0"/>
+        </a:effectRef>
+        <a:fontRef idx="minor"/>
+      </dsp:style>
+      <dsp:txBody>
+        <a:bodyPr spcFirstLastPara="0" vert="horz" wrap="square" lIns="22860" tIns="0" rIns="0" bIns="0" numCol="1" spcCol="1270" anchor="ctr" anchorCtr="0">
+          <a:noAutofit/>
+        </a:bodyPr>
+        <a:lstStyle/>
+        <a:p>
+          <a:pPr lvl="0" algn="l" defTabSz="400050">
+            <a:lnSpc>
+              <a:spcPct val="90000"/>
+            </a:lnSpc>
+            <a:spcBef>
+              <a:spcPct val="0"/>
+            </a:spcBef>
+            <a:spcAft>
+              <a:spcPct val="35000"/>
+            </a:spcAft>
+          </a:pPr>
+          <a:r>
+            <a:rPr lang="fr-FR" sz="900" kern="1200" dirty="0"/>
+            <a:t>ES2015-juin-2015</a:t>
+          </a:r>
+          <a:br>
+            <a:rPr lang="fr-FR" sz="900" kern="1200" dirty="0"/>
+          </a:br>
+          <a:endParaRPr lang="fr-FR" sz="900" kern="1200" dirty="0"/>
+        </a:p>
+      </dsp:txBody>
+      <dsp:txXfrm>
+        <a:off x="3210501" y="330687"/>
+        <a:ext cx="857287" cy="413146"/>
+      </dsp:txXfrm>
+    </dsp:sp>
+    <dsp:sp modelId="{76A16D42-EE21-4CFD-ADBA-BE6659FAAE6D}">
+      <dsp:nvSpPr>
+        <dsp:cNvPr id="0" name=""/>
+        <dsp:cNvSpPr/>
+      </dsp:nvSpPr>
+      <dsp:spPr>
+        <a:xfrm>
+          <a:off x="3845108" y="1028847"/>
+          <a:ext cx="417688" cy="417688"/>
+        </a:xfrm>
+        <a:prstGeom prst="donut">
+          <a:avLst>
+            <a:gd name="adj" fmla="val 20000"/>
+          </a:avLst>
+        </a:prstGeom>
+        <a:solidFill>
+          <a:srgbClr val="CF022B">
+            <a:hueOff val="0"/>
+            <a:satOff val="0"/>
+            <a:lumOff val="0"/>
+            <a:alphaOff val="0"/>
+          </a:srgbClr>
+        </a:solidFill>
+        <a:ln w="25400" cap="flat" cmpd="sng" algn="ctr">
+          <a:solidFill>
+            <a:srgbClr val="FFFFFF">
+              <a:hueOff val="0"/>
+              <a:satOff val="0"/>
+              <a:lumOff val="0"/>
+              <a:alphaOff val="0"/>
+            </a:srgbClr>
+          </a:solidFill>
+          <a:prstDash val="solid"/>
+        </a:ln>
+        <a:effectLst/>
+      </dsp:spPr>
+      <dsp:style>
+        <a:lnRef idx="2">
+          <a:scrgbClr r="0" g="0" b="0"/>
+        </a:lnRef>
+        <a:fillRef idx="1">
+          <a:scrgbClr r="0" g="0" b="0"/>
+        </a:fillRef>
+        <a:effectRef idx="0">
+          <a:scrgbClr r="0" g="0" b="0"/>
+        </a:effectRef>
+        <a:fontRef idx="minor">
+          <a:schemeClr val="lt1"/>
+        </a:fontRef>
+      </dsp:style>
+    </dsp:sp>
+    <dsp:sp modelId="{8E793812-5747-44EC-AE3D-D44795798B1C}">
+      <dsp:nvSpPr>
+        <dsp:cNvPr id="0" name=""/>
+        <dsp:cNvSpPr/>
+      </dsp:nvSpPr>
+      <dsp:spPr>
+        <a:xfrm rot="17700000">
+          <a:off x="3952131" y="330687"/>
+          <a:ext cx="857287" cy="413146"/>
+        </a:xfrm>
+        <a:prstGeom prst="rect">
+          <a:avLst/>
+        </a:prstGeom>
+        <a:noFill/>
+        <a:ln>
+          <a:noFill/>
+        </a:ln>
+        <a:effectLst/>
+      </dsp:spPr>
+      <dsp:style>
+        <a:lnRef idx="0">
+          <a:scrgbClr r="0" g="0" b="0"/>
+        </a:lnRef>
+        <a:fillRef idx="0">
+          <a:scrgbClr r="0" g="0" b="0"/>
+        </a:fillRef>
+        <a:effectRef idx="0">
+          <a:scrgbClr r="0" g="0" b="0"/>
+        </a:effectRef>
+        <a:fontRef idx="minor"/>
+      </dsp:style>
+      <dsp:txBody>
+        <a:bodyPr spcFirstLastPara="0" vert="horz" wrap="square" lIns="22860" tIns="0" rIns="0" bIns="0" numCol="1" spcCol="1270" anchor="ctr" anchorCtr="0">
+          <a:noAutofit/>
+        </a:bodyPr>
+        <a:lstStyle/>
+        <a:p>
+          <a:pPr lvl="0" algn="l" defTabSz="400050">
+            <a:lnSpc>
+              <a:spcPct val="90000"/>
+            </a:lnSpc>
+            <a:spcBef>
+              <a:spcPct val="0"/>
+            </a:spcBef>
+            <a:spcAft>
+              <a:spcPct val="35000"/>
+            </a:spcAft>
+          </a:pPr>
+          <a:r>
+            <a:rPr lang="fr-FR" sz="900" kern="1200" dirty="0"/>
+            <a:t>ES2016-bientôt </a:t>
+          </a:r>
+          <a:br>
+            <a:rPr lang="fr-FR" sz="900" kern="1200" dirty="0"/>
+          </a:br>
+          <a:endParaRPr lang="fr-FR" sz="900" kern="1200" dirty="0"/>
+        </a:p>
+      </dsp:txBody>
+      <dsp:txXfrm>
+        <a:off x="3952131" y="330687"/>
+        <a:ext cx="857287" cy="413146"/>
+      </dsp:txXfrm>
+    </dsp:sp>
   </dsp:spTree>
 </dsp:drawing>
 </file>
@@ -3882,137 +4563,6 @@
 </p:notes>
 </file>
 
-<file path=ppt/notesSlides/notesSlide10.xml><?xml version="1.0" encoding="utf-8"?>
-<p:notes xmlns:a="http://schemas.openxmlformats.org/drawingml/2006/main" xmlns:r="http://schemas.openxmlformats.org/officeDocument/2006/relationships" xmlns:p="http://schemas.openxmlformats.org/presentationml/2006/main">
-  <p:cSld>
-    <p:spTree>
-      <p:nvGrpSpPr>
-        <p:cNvPr id="1" name=""/>
-        <p:cNvGrpSpPr/>
-        <p:nvPr/>
-      </p:nvGrpSpPr>
-      <p:grpSpPr>
-        <a:xfrm>
-          <a:off x="0" y="0"/>
-          <a:ext cx="0" cy="0"/>
-          <a:chOff x="0" y="0"/>
-          <a:chExt cx="0" cy="0"/>
-        </a:xfrm>
-      </p:grpSpPr>
-      <p:sp>
-        <p:nvSpPr>
-          <p:cNvPr id="2" name="Espace réservé de l'image des diapositives 1"/>
-          <p:cNvSpPr>
-            <a:spLocks noGrp="1" noRot="1" noChangeAspect="1"/>
-          </p:cNvSpPr>
-          <p:nvPr>
-            <p:ph type="sldImg"/>
-          </p:nvPr>
-        </p:nvSpPr>
-        <p:spPr/>
-      </p:sp>
-      <p:sp>
-        <p:nvSpPr>
-          <p:cNvPr id="3" name="Espace réservé des commentaires 2"/>
-          <p:cNvSpPr>
-            <a:spLocks noGrp="1"/>
-          </p:cNvSpPr>
-          <p:nvPr>
-            <p:ph type="body" idx="1"/>
-          </p:nvPr>
-        </p:nvSpPr>
-        <p:spPr/>
-        <p:txBody>
-          <a:bodyPr/>
-          <a:lstStyle/>
-          <a:p>
-            <a:endParaRPr lang="fr-FR"/>
-          </a:p>
-        </p:txBody>
-      </p:sp>
-      <p:sp>
-        <p:nvSpPr>
-          <p:cNvPr id="4" name="Espace réservé de la date 3"/>
-          <p:cNvSpPr>
-            <a:spLocks noGrp="1"/>
-          </p:cNvSpPr>
-          <p:nvPr>
-            <p:ph type="dt" idx="10"/>
-          </p:nvPr>
-        </p:nvSpPr>
-        <p:spPr/>
-        <p:txBody>
-          <a:bodyPr/>
-          <a:lstStyle/>
-          <a:p>
-            <a:fld id="{C91EC732-5254-4B62-97DC-9222401B53D6}" type="datetime1">
-              <a:rPr lang="fr-FR" smtClean="0"/>
-              <a:t>16/11/2016</a:t>
-            </a:fld>
-            <a:endParaRPr lang="fr-FR"/>
-          </a:p>
-        </p:txBody>
-      </p:sp>
-      <p:sp>
-        <p:nvSpPr>
-          <p:cNvPr id="5" name="Espace réservé du pied de page 4"/>
-          <p:cNvSpPr>
-            <a:spLocks noGrp="1"/>
-          </p:cNvSpPr>
-          <p:nvPr>
-            <p:ph type="ftr" sz="quarter" idx="11"/>
-          </p:nvPr>
-        </p:nvSpPr>
-        <p:spPr/>
-        <p:txBody>
-          <a:bodyPr/>
-          <a:lstStyle/>
-          <a:p>
-            <a:r>
-              <a:rPr lang="en-GB" sz="1100" smtClean="0"/>
-              <a:t>Titre de la présentation</a:t>
-            </a:r>
-            <a:endParaRPr lang="en-GB" sz="1100" dirty="0"/>
-          </a:p>
-        </p:txBody>
-      </p:sp>
-      <p:sp>
-        <p:nvSpPr>
-          <p:cNvPr id="6" name="Espace réservé du numéro de diapositive 5"/>
-          <p:cNvSpPr>
-            <a:spLocks noGrp="1"/>
-          </p:cNvSpPr>
-          <p:nvPr>
-            <p:ph type="sldNum" sz="quarter" idx="12"/>
-          </p:nvPr>
-        </p:nvSpPr>
-        <p:spPr/>
-        <p:txBody>
-          <a:bodyPr/>
-          <a:lstStyle/>
-          <a:p>
-            <a:fld id="{305287CA-3E72-4A91-B59B-B69F40801570}" type="slidenum">
-              <a:rPr lang="en-GB" sz="1100" smtClean="0"/>
-              <a:pPr/>
-              <a:t>28</a:t>
-            </a:fld>
-            <a:endParaRPr lang="en-GB" sz="1100" dirty="0"/>
-          </a:p>
-        </p:txBody>
-      </p:sp>
-    </p:spTree>
-    <p:extLst>
-      <p:ext uri="{BB962C8B-B14F-4D97-AF65-F5344CB8AC3E}">
-        <p14:creationId xmlns:p14="http://schemas.microsoft.com/office/powerpoint/2010/main" val="1917165118"/>
-      </p:ext>
-    </p:extLst>
-  </p:cSld>
-  <p:clrMapOvr>
-    <a:masterClrMapping/>
-  </p:clrMapOvr>
-</p:notes>
-</file>
-
 <file path=ppt/notesSlides/notesSlide2.xml><?xml version="1.0" encoding="utf-8"?>
 <p:notes xmlns:a="http://schemas.openxmlformats.org/drawingml/2006/main" xmlns:r="http://schemas.openxmlformats.org/officeDocument/2006/relationships" xmlns:p="http://schemas.openxmlformats.org/presentationml/2006/main">
   <p:cSld>
@@ -4814,7 +5364,7 @@
             <a:fld id="{305287CA-3E72-4A91-B59B-B69F40801570}" type="slidenum">
               <a:rPr lang="en-GB" sz="1100" smtClean="0"/>
               <a:pPr/>
-              <a:t>24</a:t>
+              <a:t>23</a:t>
             </a:fld>
             <a:endParaRPr lang="en-GB" sz="1100" dirty="0"/>
           </a:p>
@@ -4847,7 +5397,7 @@
     </p:spTree>
     <p:extLst>
       <p:ext uri="{BB962C8B-B14F-4D97-AF65-F5344CB8AC3E}">
-        <p14:creationId xmlns:p14="http://schemas.microsoft.com/office/powerpoint/2010/main" val="525568777"/>
+        <p14:creationId xmlns:p14="http://schemas.microsoft.com/office/powerpoint/2010/main" val="4244227924"/>
       </p:ext>
     </p:extLst>
   </p:cSld>
@@ -4921,7 +5471,7 @@
           <a:lstStyle/>
           <a:p>
             <a:r>
-              <a:rPr lang="en-GB" sz="1100" smtClean="0"/>
+              <a:rPr lang="en-GB" sz="1100"/>
               <a:t>Titre de la présentation</a:t>
             </a:r>
             <a:endParaRPr lang="en-GB" sz="1100" dirty="0"/>
@@ -4946,7 +5496,7 @@
             <a:fld id="{305287CA-3E72-4A91-B59B-B69F40801570}" type="slidenum">
               <a:rPr lang="en-GB" sz="1100" smtClean="0"/>
               <a:pPr/>
-              <a:t>26</a:t>
+              <a:t>25</a:t>
             </a:fld>
             <a:endParaRPr lang="en-GB" sz="1100" dirty="0"/>
           </a:p>
@@ -4979,7 +5529,7 @@
     </p:spTree>
     <p:extLst>
       <p:ext uri="{BB962C8B-B14F-4D97-AF65-F5344CB8AC3E}">
-        <p14:creationId xmlns:p14="http://schemas.microsoft.com/office/powerpoint/2010/main" val="2439815525"/>
+        <p14:creationId xmlns:p14="http://schemas.microsoft.com/office/powerpoint/2010/main" val="525568777"/>
       </p:ext>
     </p:extLst>
   </p:cSld>
@@ -5008,7 +5558,7 @@
       </p:grpSpPr>
       <p:sp>
         <p:nvSpPr>
-          <p:cNvPr id="10" name="Espace réservé de l'image des diapositives 9"/>
+          <p:cNvPr id="2" name="Espace réservé de l'image des diapositives 1"/>
           <p:cNvSpPr>
             <a:spLocks noGrp="1" noRot="1" noChangeAspect="1"/>
           </p:cNvSpPr>
@@ -5020,7 +5570,7 @@
       </p:sp>
       <p:sp>
         <p:nvSpPr>
-          <p:cNvPr id="11" name="Espace réservé des commentaires 10"/>
+          <p:cNvPr id="3" name="Espace réservé des commentaires 2"/>
           <p:cNvSpPr>
             <a:spLocks noGrp="1"/>
           </p:cNvSpPr>
@@ -5039,12 +5589,12 @@
       </p:sp>
       <p:sp>
         <p:nvSpPr>
-          <p:cNvPr id="14" name="Espace réservé du pied de page 13"/>
-          <p:cNvSpPr>
-            <a:spLocks noGrp="1"/>
-          </p:cNvSpPr>
-          <p:nvPr>
-            <p:ph type="ftr" sz="quarter" idx="12"/>
+          <p:cNvPr id="4" name="Espace réservé de la date 3"/>
+          <p:cNvSpPr>
+            <a:spLocks noGrp="1"/>
+          </p:cNvSpPr>
+          <p:nvPr>
+            <p:ph type="dt" idx="10"/>
           </p:nvPr>
         </p:nvSpPr>
         <p:spPr/>
@@ -5052,8 +5602,31 @@
           <a:bodyPr/>
           <a:lstStyle/>
           <a:p>
-            <a:r>
-              <a:rPr lang="en-GB" sz="1100"/>
+            <a:fld id="{C91EC732-5254-4B62-97DC-9222401B53D6}" type="datetime1">
+              <a:rPr lang="fr-FR" smtClean="0"/>
+              <a:t>16/11/2016</a:t>
+            </a:fld>
+            <a:endParaRPr lang="fr-FR"/>
+          </a:p>
+        </p:txBody>
+      </p:sp>
+      <p:sp>
+        <p:nvSpPr>
+          <p:cNvPr id="5" name="Espace réservé du pied de page 4"/>
+          <p:cNvSpPr>
+            <a:spLocks noGrp="1"/>
+          </p:cNvSpPr>
+          <p:nvPr>
+            <p:ph type="ftr" sz="quarter" idx="11"/>
+          </p:nvPr>
+        </p:nvSpPr>
+        <p:spPr/>
+        <p:txBody>
+          <a:bodyPr/>
+          <a:lstStyle/>
+          <a:p>
+            <a:r>
+              <a:rPr lang="en-GB" sz="1100" smtClean="0"/>
               <a:t>Titre de la présentation</a:t>
             </a:r>
             <a:endParaRPr lang="en-GB" sz="1100" dirty="0"/>
@@ -5062,12 +5635,12 @@
       </p:sp>
       <p:sp>
         <p:nvSpPr>
-          <p:cNvPr id="15" name="Espace réservé du numéro de diapositive 14"/>
-          <p:cNvSpPr>
-            <a:spLocks noGrp="1"/>
-          </p:cNvSpPr>
-          <p:nvPr>
-            <p:ph type="sldNum" sz="quarter" idx="13"/>
+          <p:cNvPr id="6" name="Espace réservé du numéro de diapositive 5"/>
+          <p:cNvSpPr>
+            <a:spLocks noGrp="1"/>
+          </p:cNvSpPr>
+          <p:nvPr>
+            <p:ph type="sldNum" sz="quarter" idx="12"/>
           </p:nvPr>
         </p:nvSpPr>
         <p:spPr/>
@@ -5084,34 +5657,10 @@
           </a:p>
         </p:txBody>
       </p:sp>
-      <p:sp>
-        <p:nvSpPr>
-          <p:cNvPr id="2" name="Espace réservé de la date 1"/>
-          <p:cNvSpPr>
-            <a:spLocks noGrp="1"/>
-          </p:cNvSpPr>
-          <p:nvPr>
-            <p:ph type="dt" idx="14"/>
-          </p:nvPr>
-        </p:nvSpPr>
-        <p:spPr/>
-        <p:txBody>
-          <a:bodyPr/>
-          <a:lstStyle/>
-          <a:p>
-            <a:fld id="{973B10A7-8A2B-4F39-8160-83B51E5E9C07}" type="datetime1">
-              <a:rPr lang="fr-FR" smtClean="0"/>
-              <a:pPr/>
-              <a:t>16/11/2016</a:t>
-            </a:fld>
-            <a:endParaRPr lang="fr-FR"/>
-          </a:p>
-        </p:txBody>
-      </p:sp>
     </p:spTree>
     <p:extLst>
       <p:ext uri="{BB962C8B-B14F-4D97-AF65-F5344CB8AC3E}">
-        <p14:creationId xmlns:p14="http://schemas.microsoft.com/office/powerpoint/2010/main" val="4244227924"/>
+        <p14:creationId xmlns:p14="http://schemas.microsoft.com/office/powerpoint/2010/main" val="1917165118"/>
       </p:ext>
     </p:extLst>
   </p:cSld>
@@ -12987,6 +13536,13 @@
   <p:clrMapOvr>
     <a:masterClrMapping/>
   </p:clrMapOvr>
+  <p:timing>
+    <p:tnLst>
+      <p:par>
+        <p:cTn id="1" dur="indefinite" restart="never" nodeType="tmRoot"/>
+      </p:par>
+    </p:tnLst>
+  </p:timing>
 </p:sld>
 </file>
 
@@ -13154,6 +13710,13 @@
   <p:clrMapOvr>
     <a:masterClrMapping/>
   </p:clrMapOvr>
+  <p:timing>
+    <p:tnLst>
+      <p:par>
+        <p:cTn id="1" dur="indefinite" restart="never" nodeType="tmRoot"/>
+      </p:par>
+    </p:tnLst>
+  </p:timing>
 </p:sld>
 </file>
 
@@ -13321,6 +13884,13 @@
   <p:clrMapOvr>
     <a:masterClrMapping/>
   </p:clrMapOvr>
+  <p:timing>
+    <p:tnLst>
+      <p:par>
+        <p:cTn id="1" dur="indefinite" restart="never" nodeType="tmRoot"/>
+      </p:par>
+    </p:tnLst>
+  </p:timing>
 </p:sld>
 </file>
 
@@ -13424,6 +13994,13 @@
   <p:clrMapOvr>
     <a:masterClrMapping/>
   </p:clrMapOvr>
+  <p:timing>
+    <p:tnLst>
+      <p:par>
+        <p:cTn id="1" dur="indefinite" restart="never" nodeType="tmRoot"/>
+      </p:par>
+    </p:tnLst>
+  </p:timing>
 </p:sld>
 </file>
 
@@ -13560,6 +14137,13 @@
   <p:clrMapOvr>
     <a:masterClrMapping/>
   </p:clrMapOvr>
+  <p:timing>
+    <p:tnLst>
+      <p:par>
+        <p:cTn id="1" dur="indefinite" restart="never" nodeType="tmRoot"/>
+      </p:par>
+    </p:tnLst>
+  </p:timing>
 </p:sld>
 </file>
 
@@ -13663,6 +14247,13 @@
   <p:clrMapOvr>
     <a:masterClrMapping/>
   </p:clrMapOvr>
+  <p:timing>
+    <p:tnLst>
+      <p:par>
+        <p:cTn id="1" dur="indefinite" restart="never" nodeType="tmRoot"/>
+      </p:par>
+    </p:tnLst>
+  </p:timing>
 </p:sld>
 </file>
 
@@ -13818,6 +14409,13 @@
   <p:clrMapOvr>
     <a:masterClrMapping/>
   </p:clrMapOvr>
+  <p:timing>
+    <p:tnLst>
+      <p:par>
+        <p:cTn id="1" dur="indefinite" restart="never" nodeType="tmRoot"/>
+      </p:par>
+    </p:tnLst>
+  </p:timing>
 </p:sld>
 </file>
 
@@ -13973,6 +14571,13 @@
   <p:clrMapOvr>
     <a:masterClrMapping/>
   </p:clrMapOvr>
+  <p:timing>
+    <p:tnLst>
+      <p:par>
+        <p:cTn id="1" dur="indefinite" restart="never" nodeType="tmRoot"/>
+      </p:par>
+    </p:tnLst>
+  </p:timing>
 </p:sld>
 </file>
 
@@ -14133,6 +14738,13 @@
   <p:clrMapOvr>
     <a:masterClrMapping/>
   </p:clrMapOvr>
+  <p:timing>
+    <p:tnLst>
+      <p:par>
+        <p:cTn id="1" dur="indefinite" restart="never" nodeType="tmRoot"/>
+      </p:par>
+    </p:tnLst>
+  </p:timing>
 </p:sld>
 </file>
 
@@ -14291,6 +14903,13 @@
   <p:clrMapOvr>
     <a:masterClrMapping/>
   </p:clrMapOvr>
+  <p:timing>
+    <p:tnLst>
+      <p:par>
+        <p:cTn id="1" dur="indefinite" restart="never" nodeType="tmRoot"/>
+      </p:par>
+    </p:tnLst>
+  </p:timing>
 </p:sld>
 </file>
 
@@ -14473,6 +15092,13 @@
   <p:clrMapOvr>
     <a:masterClrMapping/>
   </p:clrMapOvr>
+  <p:timing>
+    <p:tnLst>
+      <p:par>
+        <p:cTn id="1" dur="indefinite" restart="never" nodeType="tmRoot"/>
+      </p:par>
+    </p:tnLst>
+  </p:timing>
 </p:sld>
 </file>
 
@@ -14563,11 +15189,7 @@
             </a:r>
             <a:r>
               <a:rPr lang="fr-FR" dirty="0" smtClean="0"/>
-              <a:t> JS 1.5 : </a:t>
-            </a:r>
-            <a:r>
-              <a:rPr lang="fr-FR" dirty="0" smtClean="0"/>
-              <a:t>Jour 1</a:t>
+              <a:t> JS 1.5 : Jour 1</a:t>
             </a:r>
             <a:endParaRPr lang="fr-FR" dirty="0"/>
           </a:p>
@@ -14596,7 +15218,6 @@
               <a:rPr lang="fr-FR" dirty="0"/>
               <a:t> JS 1 : Introduction</a:t>
             </a:r>
-            <a:endParaRPr lang="fr-FR" dirty="0"/>
           </a:p>
         </p:txBody>
       </p:sp>
@@ -14781,6 +15402,13 @@
   <p:clrMapOvr>
     <a:masterClrMapping/>
   </p:clrMapOvr>
+  <p:timing>
+    <p:tnLst>
+      <p:par>
+        <p:cTn id="1" dur="indefinite" restart="never" nodeType="tmRoot"/>
+      </p:par>
+    </p:tnLst>
+  </p:timing>
 </p:sld>
 </file>
 
@@ -14922,6 +15550,13 @@
   <p:clrMapOvr>
     <a:masterClrMapping/>
   </p:clrMapOvr>
+  <p:timing>
+    <p:tnLst>
+      <p:par>
+        <p:cTn id="1" dur="indefinite" restart="never" nodeType="tmRoot"/>
+      </p:par>
+    </p:tnLst>
+  </p:timing>
 </p:sld>
 </file>
 
@@ -15063,6 +15698,13 @@
   <p:clrMapOvr>
     <a:masterClrMapping/>
   </p:clrMapOvr>
+  <p:timing>
+    <p:tnLst>
+      <p:par>
+        <p:cTn id="1" dur="indefinite" restart="never" nodeType="tmRoot"/>
+      </p:par>
+    </p:tnLst>
+  </p:timing>
 </p:sld>
 </file>
 
@@ -15085,6 +15727,83 @@
       </p:grpSpPr>
       <p:sp>
         <p:nvSpPr>
+          <p:cNvPr id="2" name="Espace réservé du contenu 1"/>
+          <p:cNvSpPr>
+            <a:spLocks noGrp="1"/>
+          </p:cNvSpPr>
+          <p:nvPr>
+            <p:ph idx="1"/>
+          </p:nvPr>
+        </p:nvSpPr>
+        <p:spPr bwMode="gray">
+          <a:xfrm>
+            <a:off x="642938" y="1484312"/>
+            <a:ext cx="7961511" cy="4681537"/>
+          </a:xfrm>
+        </p:spPr>
+        <p:txBody>
+          <a:bodyPr/>
+          <a:lstStyle/>
+          <a:p>
+            <a:pPr fontAlgn="base">
+              <a:buFont typeface="Arial" pitchFamily="34" charset="0"/>
+              <a:buChar char="•"/>
+            </a:pPr>
+            <a:r>
+              <a:rPr lang="fr-FR" dirty="0"/>
+              <a:t>Binding </a:t>
+            </a:r>
+            <a:r>
+              <a:rPr lang="fr-FR" dirty="0" err="1"/>
+              <a:t>bi-directionnel</a:t>
+            </a:r>
+            <a:endParaRPr lang="fr-FR" dirty="0"/>
+          </a:p>
+          <a:p>
+            <a:pPr fontAlgn="base">
+              <a:buFont typeface="Arial" pitchFamily="34" charset="0"/>
+              <a:buChar char="•"/>
+            </a:pPr>
+            <a:r>
+              <a:rPr lang="fr-FR" dirty="0"/>
+              <a:t>Pattern MVW</a:t>
+            </a:r>
+          </a:p>
+          <a:p>
+            <a:pPr fontAlgn="base">
+              <a:buFont typeface="Arial" pitchFamily="34" charset="0"/>
+              <a:buChar char="•"/>
+            </a:pPr>
+            <a:r>
+              <a:rPr lang="fr-FR" dirty="0"/>
+              <a:t>Modularité</a:t>
+            </a:r>
+          </a:p>
+          <a:p>
+            <a:pPr fontAlgn="base">
+              <a:buFont typeface="Arial" pitchFamily="34" charset="0"/>
+              <a:buChar char="•"/>
+            </a:pPr>
+            <a:r>
+              <a:rPr lang="fr-FR" dirty="0" smtClean="0"/>
+              <a:t>Routage</a:t>
+            </a:r>
+            <a:endParaRPr lang="fr-FR" dirty="0"/>
+          </a:p>
+          <a:p>
+            <a:pPr fontAlgn="base">
+              <a:buFont typeface="Arial" pitchFamily="34" charset="0"/>
+              <a:buChar char="•"/>
+            </a:pPr>
+            <a:r>
+              <a:rPr lang="fr-FR" dirty="0"/>
+              <a:t>Validation</a:t>
+            </a:r>
+          </a:p>
+        </p:txBody>
+      </p:sp>
+      <p:sp>
+        <p:nvSpPr>
           <p:cNvPr id="3" name="Titre 2"/>
           <p:cNvSpPr>
             <a:spLocks noGrp="1"/>
@@ -15093,38 +15812,21 @@
             <p:ph type="title"/>
           </p:nvPr>
         </p:nvSpPr>
-        <p:spPr/>
-        <p:txBody>
-          <a:bodyPr/>
-          <a:lstStyle/>
-          <a:p>
-            <a:endParaRPr lang="fr-FR" cap="none" dirty="0"/>
-          </a:p>
-        </p:txBody>
-      </p:sp>
-      <p:sp>
-        <p:nvSpPr>
-          <p:cNvPr id="4" name="Espace réservé du pied de page 3"/>
-          <p:cNvSpPr>
-            <a:spLocks noGrp="1"/>
-          </p:cNvSpPr>
-          <p:nvPr>
-            <p:ph type="ftr" sz="quarter" idx="11"/>
-          </p:nvPr>
-        </p:nvSpPr>
-        <p:spPr/>
-        <p:txBody>
-          <a:bodyPr/>
-          <a:lstStyle/>
-          <a:p>
-            <a:r>
-              <a:rPr lang="fr-FR" dirty="0" err="1"/>
-              <a:t>Angular</a:t>
-            </a:r>
-            <a:r>
-              <a:rPr lang="fr-FR" dirty="0"/>
-              <a:t> JS 1 : Introduction</a:t>
-            </a:r>
+        <p:spPr bwMode="gray">
+          <a:xfrm>
+            <a:off x="544439" y="260648"/>
+            <a:ext cx="8045374" cy="332546"/>
+          </a:xfrm>
+        </p:spPr>
+        <p:txBody>
+          <a:bodyPr/>
+          <a:lstStyle/>
+          <a:p>
+            <a:r>
+              <a:rPr lang="fr-FR" cap="none" dirty="0"/>
+              <a:t>Introduction</a:t>
+            </a:r>
+            <a:endParaRPr lang="en-GB" cap="none" dirty="0"/>
           </a:p>
         </p:txBody>
       </p:sp>
@@ -15138,7 +15840,7 @@
             <p:ph type="sldNum" sz="quarter" idx="12"/>
           </p:nvPr>
         </p:nvSpPr>
-        <p:spPr/>
+        <p:spPr bwMode="gray"/>
         <p:txBody>
           <a:bodyPr/>
           <a:lstStyle/>
@@ -15147,6 +15849,184 @@
               <a:rPr lang="fr-FR" smtClean="0"/>
               <a:pPr/>
               <a:t>23</a:t>
+            </a:fld>
+            <a:endParaRPr lang="fr-FR" dirty="0"/>
+          </a:p>
+        </p:txBody>
+      </p:sp>
+      <p:sp>
+        <p:nvSpPr>
+          <p:cNvPr id="10" name="Espace réservé du texte 9"/>
+          <p:cNvSpPr>
+            <a:spLocks noGrp="1"/>
+          </p:cNvSpPr>
+          <p:nvPr>
+            <p:ph type="body" sz="quarter" idx="13"/>
+          </p:nvPr>
+        </p:nvSpPr>
+        <p:spPr bwMode="gray"/>
+        <p:txBody>
+          <a:bodyPr/>
+          <a:lstStyle/>
+          <a:p>
+            <a:r>
+              <a:rPr lang="en-GB" cap="none" dirty="0"/>
+              <a:t>Les </a:t>
+            </a:r>
+            <a:r>
+              <a:rPr lang="en-GB" cap="none" dirty="0" err="1"/>
+              <a:t>fonctionnalités</a:t>
+            </a:r>
+            <a:r>
+              <a:rPr lang="en-GB" cap="none" dirty="0"/>
+              <a:t> </a:t>
+            </a:r>
+            <a:r>
+              <a:rPr lang="en-GB" cap="none" dirty="0" err="1"/>
+              <a:t>intéressantes</a:t>
+            </a:r>
+            <a:r>
+              <a:rPr lang="en-GB" cap="none" dirty="0"/>
+              <a:t> </a:t>
+            </a:r>
+            <a:r>
+              <a:rPr lang="en-GB" cap="none" dirty="0" err="1"/>
+              <a:t>d’Angular</a:t>
+            </a:r>
+            <a:r>
+              <a:rPr lang="en-GB" cap="none" dirty="0"/>
+              <a:t> JS </a:t>
+            </a:r>
+          </a:p>
+        </p:txBody>
+      </p:sp>
+      <p:sp>
+        <p:nvSpPr>
+          <p:cNvPr id="6" name="Espace réservé du pied de page 5"/>
+          <p:cNvSpPr>
+            <a:spLocks noGrp="1"/>
+          </p:cNvSpPr>
+          <p:nvPr>
+            <p:ph type="ftr" sz="quarter" idx="11"/>
+          </p:nvPr>
+        </p:nvSpPr>
+        <p:spPr/>
+        <p:txBody>
+          <a:bodyPr/>
+          <a:lstStyle/>
+          <a:p>
+            <a:r>
+              <a:rPr lang="fr-FR" dirty="0" err="1"/>
+              <a:t>Angular</a:t>
+            </a:r>
+            <a:r>
+              <a:rPr lang="fr-FR" dirty="0"/>
+              <a:t> JS 1 : Introduction</a:t>
+            </a:r>
+          </a:p>
+        </p:txBody>
+      </p:sp>
+    </p:spTree>
+    <p:extLst>
+      <p:ext uri="{BB962C8B-B14F-4D97-AF65-F5344CB8AC3E}">
+        <p14:creationId xmlns:p14="http://schemas.microsoft.com/office/powerpoint/2010/main" val="777053518"/>
+      </p:ext>
+    </p:extLst>
+  </p:cSld>
+  <p:clrMapOvr>
+    <a:masterClrMapping/>
+  </p:clrMapOvr>
+  <p:timing>
+    <p:tnLst>
+      <p:par>
+        <p:cTn id="1" dur="indefinite" restart="never" nodeType="tmRoot"/>
+      </p:par>
+    </p:tnLst>
+  </p:timing>
+</p:sld>
+</file>
+
+<file path=ppt/slides/slide24.xml><?xml version="1.0" encoding="utf-8"?>
+<p:sld xmlns:a="http://schemas.openxmlformats.org/drawingml/2006/main" xmlns:r="http://schemas.openxmlformats.org/officeDocument/2006/relationships" xmlns:p="http://schemas.openxmlformats.org/presentationml/2006/main">
+  <p:cSld>
+    <p:spTree>
+      <p:nvGrpSpPr>
+        <p:cNvPr id="1" name=""/>
+        <p:cNvGrpSpPr/>
+        <p:nvPr/>
+      </p:nvGrpSpPr>
+      <p:grpSpPr>
+        <a:xfrm>
+          <a:off x="0" y="0"/>
+          <a:ext cx="0" cy="0"/>
+          <a:chOff x="0" y="0"/>
+          <a:chExt cx="0" cy="0"/>
+        </a:xfrm>
+      </p:grpSpPr>
+      <p:sp>
+        <p:nvSpPr>
+          <p:cNvPr id="3" name="Titre 2"/>
+          <p:cNvSpPr>
+            <a:spLocks noGrp="1"/>
+          </p:cNvSpPr>
+          <p:nvPr>
+            <p:ph type="title"/>
+          </p:nvPr>
+        </p:nvSpPr>
+        <p:spPr/>
+        <p:txBody>
+          <a:bodyPr/>
+          <a:lstStyle/>
+          <a:p>
+            <a:endParaRPr lang="fr-FR" cap="none" dirty="0"/>
+          </a:p>
+        </p:txBody>
+      </p:sp>
+      <p:sp>
+        <p:nvSpPr>
+          <p:cNvPr id="4" name="Espace réservé du pied de page 3"/>
+          <p:cNvSpPr>
+            <a:spLocks noGrp="1"/>
+          </p:cNvSpPr>
+          <p:nvPr>
+            <p:ph type="ftr" sz="quarter" idx="11"/>
+          </p:nvPr>
+        </p:nvSpPr>
+        <p:spPr/>
+        <p:txBody>
+          <a:bodyPr/>
+          <a:lstStyle/>
+          <a:p>
+            <a:r>
+              <a:rPr lang="fr-FR" dirty="0" err="1"/>
+              <a:t>Angular</a:t>
+            </a:r>
+            <a:r>
+              <a:rPr lang="fr-FR" dirty="0"/>
+              <a:t> JS 1 : Introduction</a:t>
+            </a:r>
+          </a:p>
+        </p:txBody>
+      </p:sp>
+      <p:sp>
+        <p:nvSpPr>
+          <p:cNvPr id="5" name="Espace réservé du numéro de diapositive 4"/>
+          <p:cNvSpPr>
+            <a:spLocks noGrp="1"/>
+          </p:cNvSpPr>
+          <p:nvPr>
+            <p:ph type="sldNum" sz="quarter" idx="12"/>
+          </p:nvPr>
+        </p:nvSpPr>
+        <p:spPr/>
+        <p:txBody>
+          <a:bodyPr/>
+          <a:lstStyle/>
+          <a:p>
+            <a:fld id="{AF43E6FD-AB27-4108-A2FC-346BB5F75E3F}" type="slidenum">
+              <a:rPr lang="fr-FR" smtClean="0"/>
+              <a:pPr/>
+              <a:t>24</a:t>
             </a:fld>
             <a:endParaRPr lang="fr-FR" dirty="0"/>
           </a:p>
@@ -15228,10 +16108,17 @@
   <p:clrMapOvr>
     <a:masterClrMapping/>
   </p:clrMapOvr>
+  <p:timing>
+    <p:tnLst>
+      <p:par>
+        <p:cTn id="1" dur="indefinite" restart="never" nodeType="tmRoot"/>
+      </p:par>
+    </p:tnLst>
+  </p:timing>
 </p:sld>
 </file>
 
-<file path=ppt/slides/slide24.xml><?xml version="1.0" encoding="utf-8"?>
+<file path=ppt/slides/slide25.xml><?xml version="1.0" encoding="utf-8"?>
 <p:sld xmlns:a="http://schemas.openxmlformats.org/drawingml/2006/main" xmlns:r="http://schemas.openxmlformats.org/officeDocument/2006/relationships" xmlns:p="http://schemas.openxmlformats.org/presentationml/2006/main">
   <p:cSld>
     <p:spTree>
@@ -15294,7 +16181,7 @@
             <a:fld id="{AF43E6FD-AB27-4108-A2FC-346BB5F75E3F}" type="slidenum">
               <a:rPr lang="fr-FR" smtClean="0"/>
               <a:pPr/>
-              <a:t>24</a:t>
+              <a:t>25</a:t>
             </a:fld>
             <a:endParaRPr lang="fr-FR" dirty="0"/>
           </a:p>
@@ -15410,10 +16297,17 @@
   <p:clrMapOvr>
     <a:masterClrMapping/>
   </p:clrMapOvr>
+  <p:timing>
+    <p:tnLst>
+      <p:par>
+        <p:cTn id="1" dur="indefinite" restart="never" nodeType="tmRoot"/>
+      </p:par>
+    </p:tnLst>
+  </p:timing>
 </p:sld>
 </file>
 
-<file path=ppt/slides/slide25.xml><?xml version="1.0" encoding="utf-8"?>
+<file path=ppt/slides/slide26.xml><?xml version="1.0" encoding="utf-8"?>
 <p:sld xmlns:a="http://schemas.openxmlformats.org/drawingml/2006/main" xmlns:r="http://schemas.openxmlformats.org/officeDocument/2006/relationships" xmlns:p="http://schemas.openxmlformats.org/presentationml/2006/main">
   <p:cSld>
     <p:spTree>
@@ -15497,7 +16391,7 @@
             <a:fld id="{AF43E6FD-AB27-4108-A2FC-346BB5F75E3F}" type="slidenum">
               <a:rPr lang="fr-FR" smtClean="0"/>
               <a:pPr/>
-              <a:t>25</a:t>
+              <a:t>26</a:t>
             </a:fld>
             <a:endParaRPr lang="fr-FR" dirty="0"/>
           </a:p>
@@ -15609,539 +16503,6 @@
   <p:clrMapOvr>
     <a:masterClrMapping/>
   </p:clrMapOvr>
-</p:sld>
-</file>
-
-<file path=ppt/slides/slide26.xml><?xml version="1.0" encoding="utf-8"?>
-<p:sld xmlns:a="http://schemas.openxmlformats.org/drawingml/2006/main" xmlns:r="http://schemas.openxmlformats.org/officeDocument/2006/relationships" xmlns:p="http://schemas.openxmlformats.org/presentationml/2006/main">
-  <p:cSld>
-    <p:spTree>
-      <p:nvGrpSpPr>
-        <p:cNvPr id="1" name=""/>
-        <p:cNvGrpSpPr/>
-        <p:nvPr/>
-      </p:nvGrpSpPr>
-      <p:grpSpPr>
-        <a:xfrm>
-          <a:off x="0" y="0"/>
-          <a:ext cx="0" cy="0"/>
-          <a:chOff x="0" y="0"/>
-          <a:chExt cx="0" cy="0"/>
-        </a:xfrm>
-      </p:grpSpPr>
-      <p:sp>
-        <p:nvSpPr>
-          <p:cNvPr id="2" name="Espace réservé du contenu 1"/>
-          <p:cNvSpPr>
-            <a:spLocks noGrp="1"/>
-          </p:cNvSpPr>
-          <p:nvPr>
-            <p:ph idx="1"/>
-          </p:nvPr>
-        </p:nvSpPr>
-        <p:spPr bwMode="gray">
-          <a:xfrm>
-            <a:off x="515938" y="1219200"/>
-            <a:ext cx="8442325" cy="4681537"/>
-          </a:xfrm>
-        </p:spPr>
-        <p:txBody>
-          <a:bodyPr/>
-          <a:lstStyle/>
-          <a:p>
-            <a:pPr fontAlgn="base">
-              <a:buFont typeface="Arial" pitchFamily="34" charset="0"/>
-              <a:buChar char="•"/>
-            </a:pPr>
-            <a:r>
-              <a:rPr lang="fr-FR" b="1" dirty="0" smtClean="0">
-                <a:solidFill>
-                  <a:srgbClr val="FF0000"/>
-                </a:solidFill>
-              </a:rPr>
-              <a:t>Model</a:t>
-            </a:r>
-            <a:r>
-              <a:rPr lang="fr-FR" dirty="0" smtClean="0"/>
-              <a:t> : purs objets JSON (POJO) contenant les données</a:t>
-            </a:r>
-          </a:p>
-          <a:p>
-            <a:pPr fontAlgn="base">
-              <a:buFont typeface="Arial" pitchFamily="34" charset="0"/>
-              <a:buChar char="•"/>
-            </a:pPr>
-            <a:r>
-              <a:rPr lang="fr-FR" b="1" dirty="0" err="1" smtClean="0">
-                <a:solidFill>
-                  <a:srgbClr val="FF0000"/>
-                </a:solidFill>
-              </a:rPr>
-              <a:t>View</a:t>
-            </a:r>
-            <a:r>
-              <a:rPr lang="fr-FR" dirty="0" smtClean="0"/>
-              <a:t> : templates HTML accédant aux données exposées</a:t>
-            </a:r>
-          </a:p>
-          <a:p>
-            <a:pPr fontAlgn="base">
-              <a:buFont typeface="Arial" pitchFamily="34" charset="0"/>
-              <a:buChar char="•"/>
-            </a:pPr>
-            <a:r>
-              <a:rPr lang="fr-FR" b="1" dirty="0" smtClean="0">
-                <a:solidFill>
-                  <a:srgbClr val="FF0000"/>
-                </a:solidFill>
-              </a:rPr>
-              <a:t>Controller</a:t>
-            </a:r>
-            <a:r>
-              <a:rPr lang="fr-FR" dirty="0" smtClean="0"/>
-              <a:t> : fonction JS exposant le modèle aux vues via l'objet $scope</a:t>
-            </a:r>
-          </a:p>
-          <a:p>
-            <a:pPr fontAlgn="base">
-              <a:buFont typeface="Arial" pitchFamily="34" charset="0"/>
-              <a:buChar char="•"/>
-            </a:pPr>
-            <a:r>
-              <a:rPr lang="fr-FR" b="1" dirty="0" smtClean="0">
-                <a:solidFill>
-                  <a:srgbClr val="FF0000"/>
-                </a:solidFill>
-              </a:rPr>
-              <a:t>Directive</a:t>
-            </a:r>
-            <a:r>
-              <a:rPr lang="fr-FR" dirty="0" smtClean="0"/>
-              <a:t> : concept spécifique Angular permettant d'ajouter du comportement aux applications. Fait souvent le lien entre la vue et le model.</a:t>
-            </a:r>
-          </a:p>
-          <a:p>
-            <a:pPr fontAlgn="base">
-              <a:buFont typeface="Arial" pitchFamily="34" charset="0"/>
-              <a:buChar char="•"/>
-            </a:pPr>
-            <a:r>
-              <a:rPr lang="fr-FR" b="1" dirty="0" smtClean="0">
-                <a:solidFill>
-                  <a:srgbClr val="FF0000"/>
-                </a:solidFill>
-              </a:rPr>
-              <a:t>Service</a:t>
-            </a:r>
-            <a:r>
-              <a:rPr lang="fr-FR" dirty="0" smtClean="0"/>
-              <a:t> :  permet de concentrer la logique hors des </a:t>
-            </a:r>
-            <a:r>
-              <a:rPr lang="fr-FR" dirty="0" err="1" smtClean="0"/>
-              <a:t>controllers</a:t>
-            </a:r>
-            <a:r>
-              <a:rPr lang="fr-FR" dirty="0" smtClean="0"/>
-              <a:t> qui doivent rester compacts et compréhensibles</a:t>
-            </a:r>
-          </a:p>
-          <a:p>
-            <a:endParaRPr lang="en-US" dirty="0" smtClean="0"/>
-          </a:p>
-        </p:txBody>
-      </p:sp>
-      <p:sp>
-        <p:nvSpPr>
-          <p:cNvPr id="3" name="Titre 2"/>
-          <p:cNvSpPr>
-            <a:spLocks noGrp="1"/>
-          </p:cNvSpPr>
-          <p:nvPr>
-            <p:ph type="title"/>
-          </p:nvPr>
-        </p:nvSpPr>
-        <p:spPr bwMode="gray">
-          <a:xfrm>
-            <a:off x="544439" y="632880"/>
-            <a:ext cx="8045374" cy="332546"/>
-          </a:xfrm>
-        </p:spPr>
-        <p:txBody>
-          <a:bodyPr/>
-          <a:lstStyle/>
-          <a:p>
-            <a:r>
-              <a:rPr lang="fr-FR" cap="none" dirty="0" smtClean="0"/>
-              <a:t>Les concepts</a:t>
-            </a:r>
-            <a:endParaRPr lang="en-GB" cap="none" dirty="0"/>
-          </a:p>
-        </p:txBody>
-      </p:sp>
-      <p:sp>
-        <p:nvSpPr>
-          <p:cNvPr id="5" name="Espace réservé du numéro de diapositive 4"/>
-          <p:cNvSpPr>
-            <a:spLocks noGrp="1"/>
-          </p:cNvSpPr>
-          <p:nvPr>
-            <p:ph type="sldNum" sz="quarter" idx="12"/>
-          </p:nvPr>
-        </p:nvSpPr>
-        <p:spPr bwMode="gray"/>
-        <p:txBody>
-          <a:bodyPr/>
-          <a:lstStyle/>
-          <a:p>
-            <a:fld id="{AF43E6FD-AB27-4108-A2FC-346BB5F75E3F}" type="slidenum">
-              <a:rPr lang="fr-FR" smtClean="0"/>
-              <a:pPr/>
-              <a:t>26</a:t>
-            </a:fld>
-            <a:endParaRPr lang="fr-FR" dirty="0"/>
-          </a:p>
-        </p:txBody>
-      </p:sp>
-      <p:sp>
-        <p:nvSpPr>
-          <p:cNvPr id="6" name="Espace réservé du pied de page 5"/>
-          <p:cNvSpPr>
-            <a:spLocks noGrp="1"/>
-          </p:cNvSpPr>
-          <p:nvPr>
-            <p:ph type="ftr" sz="quarter" idx="11"/>
-          </p:nvPr>
-        </p:nvSpPr>
-        <p:spPr/>
-        <p:txBody>
-          <a:bodyPr/>
-          <a:lstStyle/>
-          <a:p>
-            <a:r>
-              <a:rPr lang="fr-FR" dirty="0" err="1"/>
-              <a:t>Angular</a:t>
-            </a:r>
-            <a:r>
-              <a:rPr lang="fr-FR" dirty="0"/>
-              <a:t> JS 1 : Introduction</a:t>
-            </a:r>
-          </a:p>
-        </p:txBody>
-      </p:sp>
-      <p:sp>
-        <p:nvSpPr>
-          <p:cNvPr id="17" name="Ellipse 16"/>
-          <p:cNvSpPr/>
-          <p:nvPr/>
-        </p:nvSpPr>
-        <p:spPr>
-          <a:xfrm>
-            <a:off x="1783533" y="4471988"/>
-            <a:ext cx="5353191" cy="1914525"/>
-          </a:xfrm>
-          <a:prstGeom prst="ellipse">
-            <a:avLst/>
-          </a:prstGeom>
-          <a:solidFill>
-            <a:schemeClr val="accent5">
-              <a:alpha val="28000"/>
-            </a:schemeClr>
-          </a:solidFill>
-          <a:ln/>
-        </p:spPr>
-        <p:style>
-          <a:lnRef idx="2">
-            <a:schemeClr val="accent5">
-              <a:shade val="50000"/>
-            </a:schemeClr>
-          </a:lnRef>
-          <a:fillRef idx="1">
-            <a:schemeClr val="accent5"/>
-          </a:fillRef>
-          <a:effectRef idx="0">
-            <a:schemeClr val="accent5"/>
-          </a:effectRef>
-          <a:fontRef idx="minor">
-            <a:schemeClr val="lt1"/>
-          </a:fontRef>
-        </p:style>
-        <p:txBody>
-          <a:bodyPr rtlCol="0" anchor="ctr"/>
-          <a:lstStyle/>
-          <a:p>
-            <a:pPr algn="ctr"/>
-            <a:endParaRPr lang="fr-FR" dirty="0" smtClean="0"/>
-          </a:p>
-        </p:txBody>
-      </p:sp>
-      <p:sp>
-        <p:nvSpPr>
-          <p:cNvPr id="18" name="Ellipse 17"/>
-          <p:cNvSpPr/>
-          <p:nvPr/>
-        </p:nvSpPr>
-        <p:spPr>
-          <a:xfrm>
-            <a:off x="3736178" y="4614863"/>
-            <a:ext cx="5076583" cy="1771650"/>
-          </a:xfrm>
-          <a:prstGeom prst="ellipse">
-            <a:avLst/>
-          </a:prstGeom>
-          <a:solidFill>
-            <a:schemeClr val="accent6">
-              <a:alpha val="29000"/>
-            </a:schemeClr>
-          </a:solidFill>
-          <a:ln/>
-        </p:spPr>
-        <p:style>
-          <a:lnRef idx="2">
-            <a:schemeClr val="accent6">
-              <a:shade val="50000"/>
-            </a:schemeClr>
-          </a:lnRef>
-          <a:fillRef idx="1">
-            <a:schemeClr val="accent6"/>
-          </a:fillRef>
-          <a:effectRef idx="0">
-            <a:schemeClr val="accent6"/>
-          </a:effectRef>
-          <a:fontRef idx="minor">
-            <a:schemeClr val="lt1"/>
-          </a:fontRef>
-        </p:style>
-        <p:txBody>
-          <a:bodyPr rtlCol="0" anchor="ctr"/>
-          <a:lstStyle/>
-          <a:p>
-            <a:pPr algn="ctr"/>
-            <a:endParaRPr lang="fr-FR" dirty="0" smtClean="0"/>
-          </a:p>
-        </p:txBody>
-      </p:sp>
-      <p:sp>
-        <p:nvSpPr>
-          <p:cNvPr id="19" name="Ellipse 18"/>
-          <p:cNvSpPr/>
-          <p:nvPr/>
-        </p:nvSpPr>
-        <p:spPr>
-          <a:xfrm>
-            <a:off x="4014935" y="5041632"/>
-            <a:ext cx="1214437" cy="871538"/>
-          </a:xfrm>
-          <a:prstGeom prst="ellipse">
-            <a:avLst/>
-          </a:prstGeom>
-          <a:ln/>
-        </p:spPr>
-        <p:style>
-          <a:lnRef idx="0">
-            <a:schemeClr val="accent2"/>
-          </a:lnRef>
-          <a:fillRef idx="3">
-            <a:schemeClr val="accent2"/>
-          </a:fillRef>
-          <a:effectRef idx="3">
-            <a:schemeClr val="accent2"/>
-          </a:effectRef>
-          <a:fontRef idx="minor">
-            <a:schemeClr val="lt1"/>
-          </a:fontRef>
-        </p:style>
-        <p:txBody>
-          <a:bodyPr rtlCol="0" anchor="ctr"/>
-          <a:lstStyle/>
-          <a:p>
-            <a:pPr algn="ctr"/>
-            <a:r>
-              <a:rPr lang="fr-FR" dirty="0" smtClean="0"/>
-              <a:t>Model</a:t>
-            </a:r>
-          </a:p>
-        </p:txBody>
-      </p:sp>
-      <p:sp>
-        <p:nvSpPr>
-          <p:cNvPr id="20" name="Ellipse 19"/>
-          <p:cNvSpPr/>
-          <p:nvPr/>
-        </p:nvSpPr>
-        <p:spPr>
-          <a:xfrm>
-            <a:off x="7260578" y="5041632"/>
-            <a:ext cx="1214437" cy="871538"/>
-          </a:xfrm>
-          <a:prstGeom prst="ellipse">
-            <a:avLst/>
-          </a:prstGeom>
-          <a:ln/>
-        </p:spPr>
-        <p:style>
-          <a:lnRef idx="0">
-            <a:schemeClr val="accent2"/>
-          </a:lnRef>
-          <a:fillRef idx="3">
-            <a:schemeClr val="accent2"/>
-          </a:fillRef>
-          <a:effectRef idx="3">
-            <a:schemeClr val="accent2"/>
-          </a:effectRef>
-          <a:fontRef idx="minor">
-            <a:schemeClr val="lt1"/>
-          </a:fontRef>
-        </p:style>
-        <p:txBody>
-          <a:bodyPr rtlCol="0" anchor="ctr"/>
-          <a:lstStyle/>
-          <a:p>
-            <a:pPr algn="ctr"/>
-            <a:r>
-              <a:rPr lang="fr-FR" dirty="0" err="1" smtClean="0"/>
-              <a:t>View</a:t>
-            </a:r>
-            <a:endParaRPr lang="fr-FR" dirty="0" smtClean="0"/>
-          </a:p>
-        </p:txBody>
-      </p:sp>
-      <p:sp>
-        <p:nvSpPr>
-          <p:cNvPr id="21" name="Ellipse 20"/>
-          <p:cNvSpPr/>
-          <p:nvPr/>
-        </p:nvSpPr>
-        <p:spPr>
-          <a:xfrm>
-            <a:off x="1941101" y="4997598"/>
-            <a:ext cx="1628775" cy="871538"/>
-          </a:xfrm>
-          <a:prstGeom prst="ellipse">
-            <a:avLst/>
-          </a:prstGeom>
-          <a:ln/>
-        </p:spPr>
-        <p:style>
-          <a:lnRef idx="0">
-            <a:schemeClr val="accent2"/>
-          </a:lnRef>
-          <a:fillRef idx="3">
-            <a:schemeClr val="accent2"/>
-          </a:fillRef>
-          <a:effectRef idx="3">
-            <a:schemeClr val="accent2"/>
-          </a:effectRef>
-          <a:fontRef idx="minor">
-            <a:schemeClr val="lt1"/>
-          </a:fontRef>
-        </p:style>
-        <p:txBody>
-          <a:bodyPr rtlCol="0" anchor="ctr"/>
-          <a:lstStyle/>
-          <a:p>
-            <a:pPr algn="ctr"/>
-            <a:r>
-              <a:rPr lang="fr-FR" dirty="0" smtClean="0"/>
-              <a:t>Controller</a:t>
-            </a:r>
-          </a:p>
-        </p:txBody>
-      </p:sp>
-      <p:sp>
-        <p:nvSpPr>
-          <p:cNvPr id="22" name="Rectangle à coins arrondis 21"/>
-          <p:cNvSpPr/>
-          <p:nvPr/>
-        </p:nvSpPr>
-        <p:spPr>
-          <a:xfrm>
-            <a:off x="5631531" y="5208125"/>
-            <a:ext cx="1285875" cy="500063"/>
-          </a:xfrm>
-          <a:prstGeom prst="roundRect">
-            <a:avLst/>
-          </a:prstGeom>
-          <a:ln/>
-        </p:spPr>
-        <p:style>
-          <a:lnRef idx="0">
-            <a:schemeClr val="accent6"/>
-          </a:lnRef>
-          <a:fillRef idx="3">
-            <a:schemeClr val="accent6"/>
-          </a:fillRef>
-          <a:effectRef idx="3">
-            <a:schemeClr val="accent6"/>
-          </a:effectRef>
-          <a:fontRef idx="minor">
-            <a:schemeClr val="lt1"/>
-          </a:fontRef>
-        </p:style>
-        <p:txBody>
-          <a:bodyPr rtlCol="0" anchor="ctr"/>
-          <a:lstStyle/>
-          <a:p>
-            <a:pPr algn="ctr"/>
-            <a:r>
-              <a:rPr lang="fr-FR" dirty="0" smtClean="0"/>
-              <a:t>Directive</a:t>
-            </a:r>
-          </a:p>
-        </p:txBody>
-      </p:sp>
-      <p:sp>
-        <p:nvSpPr>
-          <p:cNvPr id="23" name="Rectangle à coins arrondis 22"/>
-          <p:cNvSpPr/>
-          <p:nvPr/>
-        </p:nvSpPr>
-        <p:spPr>
-          <a:xfrm>
-            <a:off x="414507" y="5174294"/>
-            <a:ext cx="1285875" cy="500063"/>
-          </a:xfrm>
-          <a:prstGeom prst="roundRect">
-            <a:avLst/>
-          </a:prstGeom>
-          <a:ln/>
-        </p:spPr>
-        <p:style>
-          <a:lnRef idx="0">
-            <a:schemeClr val="accent5"/>
-          </a:lnRef>
-          <a:fillRef idx="3">
-            <a:schemeClr val="accent5"/>
-          </a:fillRef>
-          <a:effectRef idx="3">
-            <a:schemeClr val="accent5"/>
-          </a:effectRef>
-          <a:fontRef idx="minor">
-            <a:schemeClr val="lt1"/>
-          </a:fontRef>
-        </p:style>
-        <p:txBody>
-          <a:bodyPr rtlCol="0" anchor="ctr"/>
-          <a:lstStyle/>
-          <a:p>
-            <a:pPr algn="ctr"/>
-            <a:r>
-              <a:rPr lang="fr-FR" dirty="0" smtClean="0"/>
-              <a:t>Service</a:t>
-            </a:r>
-          </a:p>
-        </p:txBody>
-      </p:sp>
-    </p:spTree>
-    <p:extLst>
-      <p:ext uri="{BB962C8B-B14F-4D97-AF65-F5344CB8AC3E}">
-        <p14:creationId xmlns:p14="http://schemas.microsoft.com/office/powerpoint/2010/main" val="4094413936"/>
-      </p:ext>
-    </p:extLst>
-  </p:cSld>
-  <p:clrMapOvr>
-    <a:masterClrMapping/>
-  </p:clrMapOvr>
   <p:timing>
     <p:tnLst>
       <p:par>
@@ -16171,112 +16532,7 @@
       </p:grpSpPr>
       <p:sp>
         <p:nvSpPr>
-          <p:cNvPr id="2" name="Espace réservé du contenu 1"/>
-          <p:cNvSpPr>
-            <a:spLocks noGrp="1"/>
-          </p:cNvSpPr>
-          <p:nvPr>
-            <p:ph idx="1"/>
-          </p:nvPr>
-        </p:nvSpPr>
-        <p:spPr bwMode="gray">
-          <a:xfrm>
-            <a:off x="642938" y="1484312"/>
-            <a:ext cx="7961511" cy="4681537"/>
-          </a:xfrm>
-        </p:spPr>
-        <p:txBody>
-          <a:bodyPr/>
-          <a:lstStyle/>
-          <a:p>
-            <a:pPr fontAlgn="base">
-              <a:buFont typeface="Arial" pitchFamily="34" charset="0"/>
-              <a:buChar char="•"/>
-            </a:pPr>
-            <a:r>
-              <a:rPr lang="fr-FR" dirty="0"/>
-              <a:t>Binding </a:t>
-            </a:r>
-            <a:r>
-              <a:rPr lang="fr-FR" dirty="0" err="1"/>
-              <a:t>bi-directionnel</a:t>
-            </a:r>
-            <a:endParaRPr lang="fr-FR" dirty="0"/>
-          </a:p>
-          <a:p>
-            <a:pPr fontAlgn="base">
-              <a:buFont typeface="Arial" pitchFamily="34" charset="0"/>
-              <a:buChar char="•"/>
-            </a:pPr>
-            <a:r>
-              <a:rPr lang="fr-FR" dirty="0"/>
-              <a:t>Pattern MVW</a:t>
-            </a:r>
-          </a:p>
-          <a:p>
-            <a:pPr fontAlgn="base">
-              <a:buFont typeface="Arial" pitchFamily="34" charset="0"/>
-              <a:buChar char="•"/>
-            </a:pPr>
-            <a:r>
-              <a:rPr lang="fr-FR" dirty="0"/>
-              <a:t>Modularité</a:t>
-            </a:r>
-          </a:p>
-          <a:p>
-            <a:pPr fontAlgn="base">
-              <a:buFont typeface="Arial" pitchFamily="34" charset="0"/>
-              <a:buChar char="•"/>
-            </a:pPr>
-            <a:r>
-              <a:rPr lang="fr-FR" dirty="0" smtClean="0"/>
-              <a:t>Routage</a:t>
-            </a:r>
-            <a:endParaRPr lang="fr-FR" dirty="0"/>
-          </a:p>
-          <a:p>
-            <a:pPr fontAlgn="base">
-              <a:buFont typeface="Arial" pitchFamily="34" charset="0"/>
-              <a:buChar char="•"/>
-            </a:pPr>
-            <a:r>
-              <a:rPr lang="fr-FR" dirty="0"/>
-              <a:t>Validation</a:t>
-            </a:r>
-          </a:p>
-        </p:txBody>
-      </p:sp>
-      <p:sp>
-        <p:nvSpPr>
-          <p:cNvPr id="3" name="Titre 2"/>
-          <p:cNvSpPr>
-            <a:spLocks noGrp="1"/>
-          </p:cNvSpPr>
-          <p:nvPr>
-            <p:ph type="title"/>
-          </p:nvPr>
-        </p:nvSpPr>
-        <p:spPr bwMode="gray">
-          <a:xfrm>
-            <a:off x="544439" y="260648"/>
-            <a:ext cx="8045374" cy="332546"/>
-          </a:xfrm>
-        </p:spPr>
-        <p:txBody>
-          <a:bodyPr/>
-          <a:lstStyle/>
-          <a:p>
-            <a:r>
-              <a:rPr lang="fr-FR" cap="none" dirty="0"/>
-              <a:t>Introduction</a:t>
-            </a:r>
-            <a:endParaRPr lang="en-GB" cap="none" dirty="0"/>
-          </a:p>
-        </p:txBody>
-      </p:sp>
-      <p:sp>
-        <p:nvSpPr>
-          <p:cNvPr id="5" name="Espace réservé du numéro de diapositive 4"/>
+          <p:cNvPr id="4" name="Espace réservé du numéro de diapositive 3"/>
           <p:cNvSpPr>
             <a:spLocks noGrp="1"/>
           </p:cNvSpPr>
@@ -16284,7 +16540,7 @@
             <p:ph type="sldNum" sz="quarter" idx="12"/>
           </p:nvPr>
         </p:nvSpPr>
-        <p:spPr bwMode="gray"/>
+        <p:spPr/>
         <p:txBody>
           <a:bodyPr/>
           <a:lstStyle/>
@@ -16293,132 +16549,6 @@
               <a:rPr lang="fr-FR" smtClean="0"/>
               <a:pPr/>
               <a:t>27</a:t>
-            </a:fld>
-            <a:endParaRPr lang="fr-FR" dirty="0"/>
-          </a:p>
-        </p:txBody>
-      </p:sp>
-      <p:sp>
-        <p:nvSpPr>
-          <p:cNvPr id="10" name="Espace réservé du texte 9"/>
-          <p:cNvSpPr>
-            <a:spLocks noGrp="1"/>
-          </p:cNvSpPr>
-          <p:nvPr>
-            <p:ph type="body" sz="quarter" idx="13"/>
-          </p:nvPr>
-        </p:nvSpPr>
-        <p:spPr bwMode="gray"/>
-        <p:txBody>
-          <a:bodyPr/>
-          <a:lstStyle/>
-          <a:p>
-            <a:r>
-              <a:rPr lang="en-GB" cap="none" dirty="0"/>
-              <a:t>Les </a:t>
-            </a:r>
-            <a:r>
-              <a:rPr lang="en-GB" cap="none" dirty="0" err="1"/>
-              <a:t>fonctionnalités</a:t>
-            </a:r>
-            <a:r>
-              <a:rPr lang="en-GB" cap="none" dirty="0"/>
-              <a:t> </a:t>
-            </a:r>
-            <a:r>
-              <a:rPr lang="en-GB" cap="none" dirty="0" err="1"/>
-              <a:t>intéressantes</a:t>
-            </a:r>
-            <a:r>
-              <a:rPr lang="en-GB" cap="none" dirty="0"/>
-              <a:t> </a:t>
-            </a:r>
-            <a:r>
-              <a:rPr lang="en-GB" cap="none" dirty="0" err="1"/>
-              <a:t>d’Angular</a:t>
-            </a:r>
-            <a:r>
-              <a:rPr lang="en-GB" cap="none" dirty="0"/>
-              <a:t> JS </a:t>
-            </a:r>
-          </a:p>
-        </p:txBody>
-      </p:sp>
-      <p:sp>
-        <p:nvSpPr>
-          <p:cNvPr id="6" name="Espace réservé du pied de page 5"/>
-          <p:cNvSpPr>
-            <a:spLocks noGrp="1"/>
-          </p:cNvSpPr>
-          <p:nvPr>
-            <p:ph type="ftr" sz="quarter" idx="11"/>
-          </p:nvPr>
-        </p:nvSpPr>
-        <p:spPr/>
-        <p:txBody>
-          <a:bodyPr/>
-          <a:lstStyle/>
-          <a:p>
-            <a:r>
-              <a:rPr lang="fr-FR" dirty="0" err="1"/>
-              <a:t>Angular</a:t>
-            </a:r>
-            <a:r>
-              <a:rPr lang="fr-FR" dirty="0"/>
-              <a:t> JS 1 : Introduction</a:t>
-            </a:r>
-          </a:p>
-        </p:txBody>
-      </p:sp>
-    </p:spTree>
-    <p:extLst>
-      <p:ext uri="{BB962C8B-B14F-4D97-AF65-F5344CB8AC3E}">
-        <p14:creationId xmlns:p14="http://schemas.microsoft.com/office/powerpoint/2010/main" val="777053518"/>
-      </p:ext>
-    </p:extLst>
-  </p:cSld>
-  <p:clrMapOvr>
-    <a:masterClrMapping/>
-  </p:clrMapOvr>
-</p:sld>
-</file>
-
-<file path=ppt/slides/slide28.xml><?xml version="1.0" encoding="utf-8"?>
-<p:sld xmlns:a="http://schemas.openxmlformats.org/drawingml/2006/main" xmlns:r="http://schemas.openxmlformats.org/officeDocument/2006/relationships" xmlns:p="http://schemas.openxmlformats.org/presentationml/2006/main">
-  <p:cSld>
-    <p:spTree>
-      <p:nvGrpSpPr>
-        <p:cNvPr id="1" name=""/>
-        <p:cNvGrpSpPr/>
-        <p:nvPr/>
-      </p:nvGrpSpPr>
-      <p:grpSpPr>
-        <a:xfrm>
-          <a:off x="0" y="0"/>
-          <a:ext cx="0" cy="0"/>
-          <a:chOff x="0" y="0"/>
-          <a:chExt cx="0" cy="0"/>
-        </a:xfrm>
-      </p:grpSpPr>
-      <p:sp>
-        <p:nvSpPr>
-          <p:cNvPr id="4" name="Espace réservé du numéro de diapositive 3"/>
-          <p:cNvSpPr>
-            <a:spLocks noGrp="1"/>
-          </p:cNvSpPr>
-          <p:nvPr>
-            <p:ph type="sldNum" sz="quarter" idx="12"/>
-          </p:nvPr>
-        </p:nvSpPr>
-        <p:spPr/>
-        <p:txBody>
-          <a:bodyPr/>
-          <a:lstStyle/>
-          <a:p>
-            <a:fld id="{AF43E6FD-AB27-4108-A2FC-346BB5F75E3F}" type="slidenum">
-              <a:rPr lang="fr-FR" smtClean="0"/>
-              <a:pPr/>
-              <a:t>28</a:t>
             </a:fld>
             <a:endParaRPr lang="fr-FR"/>
           </a:p>
@@ -16734,7 +16864,6 @@
               <a:rPr lang="fr-FR" dirty="0"/>
               <a:t> JS 1 : Introduction</a:t>
             </a:r>
-            <a:endParaRPr lang="fr-FR" dirty="0"/>
           </a:p>
         </p:txBody>
       </p:sp>
@@ -16978,7 +17107,6 @@
               <a:rPr lang="fr-FR" dirty="0"/>
               <a:t> JS 1 : Introduction</a:t>
             </a:r>
-            <a:endParaRPr lang="fr-FR" dirty="0"/>
           </a:p>
         </p:txBody>
       </p:sp>
@@ -17284,6 +17412,13 @@
   <p:clrMapOvr>
     <a:masterClrMapping/>
   </p:clrMapOvr>
+  <p:timing>
+    <p:tnLst>
+      <p:par>
+        <p:cTn id="1" dur="indefinite" restart="never" nodeType="tmRoot"/>
+      </p:par>
+    </p:tnLst>
+  </p:timing>
 </p:sld>
 </file>
 
@@ -17620,6 +17755,13 @@
   <p:clrMapOvr>
     <a:masterClrMapping/>
   </p:clrMapOvr>
+  <p:timing>
+    <p:tnLst>
+      <p:par>
+        <p:cTn id="1" dur="indefinite" restart="never" nodeType="tmRoot"/>
+      </p:par>
+    </p:tnLst>
+  </p:timing>
 </p:sld>
 </file>
 
@@ -17787,6 +17929,13 @@
   <p:clrMapOvr>
     <a:masterClrMapping/>
   </p:clrMapOvr>
+  <p:timing>
+    <p:tnLst>
+      <p:par>
+        <p:cTn id="1" dur="indefinite" restart="never" nodeType="tmRoot"/>
+      </p:par>
+    </p:tnLst>
+  </p:timing>
 </p:sld>
 </file>
 
@@ -17970,6 +18119,13 @@
   <p:clrMapOvr>
     <a:masterClrMapping/>
   </p:clrMapOvr>
+  <p:timing>
+    <p:tnLst>
+      <p:par>
+        <p:cTn id="1" dur="indefinite" restart="never" nodeType="tmRoot"/>
+      </p:par>
+    </p:tnLst>
+  </p:timing>
 </p:sld>
 </file>
 
@@ -18141,6 +18297,13 @@
   <p:clrMapOvr>
     <a:masterClrMapping/>
   </p:clrMapOvr>
+  <p:timing>
+    <p:tnLst>
+      <p:par>
+        <p:cTn id="1" dur="indefinite" restart="never" nodeType="tmRoot"/>
+      </p:par>
+    </p:tnLst>
+  </p:timing>
 </p:sld>
 </file>
 

</xml_diff>

<commit_message>
Ajout du chapire I18N
</commit_message>
<xml_diff>
--- a/Jour1/01 Introduction/Introduction.pptx
+++ b/Jour1/01 Introduction/Introduction.pptx
@@ -1502,688 +1502,6 @@
       <dsp:cNvGrpSpPr/>
     </dsp:nvGrpSpPr>
     <dsp:grpSpPr/>
-    <dsp:sp modelId="{238DF370-80EC-49DD-8516-6A1724E927B8}">
-      <dsp:nvSpPr>
-        <dsp:cNvPr id="0" name=""/>
-        <dsp:cNvSpPr/>
-      </dsp:nvSpPr>
-      <dsp:spPr>
-        <a:xfrm>
-          <a:off x="151839" y="1043733"/>
-          <a:ext cx="387917" cy="387917"/>
-        </a:xfrm>
-        <a:prstGeom prst="donut">
-          <a:avLst>
-            <a:gd name="adj" fmla="val 20000"/>
-          </a:avLst>
-        </a:prstGeom>
-        <a:solidFill>
-          <a:schemeClr val="accent1">
-            <a:hueOff val="0"/>
-            <a:satOff val="0"/>
-            <a:lumOff val="0"/>
-            <a:alphaOff val="0"/>
-          </a:schemeClr>
-        </a:solidFill>
-        <a:ln w="25400" cap="flat" cmpd="sng" algn="ctr">
-          <a:solidFill>
-            <a:schemeClr val="lt1">
-              <a:hueOff val="0"/>
-              <a:satOff val="0"/>
-              <a:lumOff val="0"/>
-              <a:alphaOff val="0"/>
-            </a:schemeClr>
-          </a:solidFill>
-          <a:prstDash val="solid"/>
-        </a:ln>
-        <a:effectLst/>
-      </dsp:spPr>
-      <dsp:style>
-        <a:lnRef idx="2">
-          <a:scrgbClr r="0" g="0" b="0"/>
-        </a:lnRef>
-        <a:fillRef idx="1">
-          <a:scrgbClr r="0" g="0" b="0"/>
-        </a:fillRef>
-        <a:effectRef idx="0">
-          <a:scrgbClr r="0" g="0" b="0"/>
-        </a:effectRef>
-        <a:fontRef idx="minor">
-          <a:schemeClr val="lt1"/>
-        </a:fontRef>
-      </dsp:style>
-    </dsp:sp>
-    <dsp:sp modelId="{1D96FCE4-59C2-4680-B9DE-0B6340D9FA38}">
-      <dsp:nvSpPr>
-        <dsp:cNvPr id="0" name=""/>
-        <dsp:cNvSpPr/>
-      </dsp:nvSpPr>
-      <dsp:spPr>
-        <a:xfrm rot="17700000">
-          <a:off x="243977" y="330687"/>
-          <a:ext cx="857287" cy="413146"/>
-        </a:xfrm>
-        <a:prstGeom prst="rect">
-          <a:avLst/>
-        </a:prstGeom>
-        <a:noFill/>
-        <a:ln>
-          <a:noFill/>
-        </a:ln>
-        <a:effectLst/>
-      </dsp:spPr>
-      <dsp:style>
-        <a:lnRef idx="0">
-          <a:scrgbClr r="0" g="0" b="0"/>
-        </a:lnRef>
-        <a:fillRef idx="0">
-          <a:scrgbClr r="0" g="0" b="0"/>
-        </a:fillRef>
-        <a:effectRef idx="0">
-          <a:scrgbClr r="0" g="0" b="0"/>
-        </a:effectRef>
-        <a:fontRef idx="minor"/>
-      </dsp:style>
-      <dsp:txBody>
-        <a:bodyPr spcFirstLastPara="0" vert="horz" wrap="square" lIns="22860" tIns="0" rIns="0" bIns="0" numCol="1" spcCol="1270" anchor="ctr" anchorCtr="0">
-          <a:noAutofit/>
-        </a:bodyPr>
-        <a:lstStyle/>
-        <a:p>
-          <a:pPr lvl="0" algn="l" defTabSz="400050">
-            <a:lnSpc>
-              <a:spcPct val="90000"/>
-            </a:lnSpc>
-            <a:spcBef>
-              <a:spcPct val="0"/>
-            </a:spcBef>
-            <a:spcAft>
-              <a:spcPct val="35000"/>
-            </a:spcAft>
-          </a:pPr>
-          <a:r>
-            <a:rPr lang="fr-FR" sz="900" kern="1200" dirty="0"/>
-            <a:t>mars 1996</a:t>
-          </a:r>
-        </a:p>
-      </dsp:txBody>
-      <dsp:txXfrm>
-        <a:off x="243977" y="330687"/>
-        <a:ext cx="857287" cy="413146"/>
-      </dsp:txXfrm>
-    </dsp:sp>
-    <dsp:sp modelId="{108974EB-7EA9-4E97-9289-B3949C4A74E3}">
-      <dsp:nvSpPr>
-        <dsp:cNvPr id="0" name=""/>
-        <dsp:cNvSpPr/>
-      </dsp:nvSpPr>
-      <dsp:spPr>
-        <a:xfrm>
-          <a:off x="886291" y="1036554"/>
-          <a:ext cx="402275" cy="402275"/>
-        </a:xfrm>
-        <a:prstGeom prst="donut">
-          <a:avLst>
-            <a:gd name="adj" fmla="val 20000"/>
-          </a:avLst>
-        </a:prstGeom>
-        <a:solidFill>
-          <a:schemeClr val="accent1">
-            <a:hueOff val="0"/>
-            <a:satOff val="0"/>
-            <a:lumOff val="0"/>
-            <a:alphaOff val="0"/>
-          </a:schemeClr>
-        </a:solidFill>
-        <a:ln w="25400" cap="flat" cmpd="sng" algn="ctr">
-          <a:solidFill>
-            <a:schemeClr val="lt1">
-              <a:hueOff val="0"/>
-              <a:satOff val="0"/>
-              <a:lumOff val="0"/>
-              <a:alphaOff val="0"/>
-            </a:schemeClr>
-          </a:solidFill>
-          <a:prstDash val="solid"/>
-        </a:ln>
-        <a:effectLst/>
-      </dsp:spPr>
-      <dsp:style>
-        <a:lnRef idx="2">
-          <a:scrgbClr r="0" g="0" b="0"/>
-        </a:lnRef>
-        <a:fillRef idx="1">
-          <a:scrgbClr r="0" g="0" b="0"/>
-        </a:fillRef>
-        <a:effectRef idx="0">
-          <a:scrgbClr r="0" g="0" b="0"/>
-        </a:effectRef>
-        <a:fontRef idx="minor">
-          <a:schemeClr val="lt1"/>
-        </a:fontRef>
-      </dsp:style>
-    </dsp:sp>
-    <dsp:sp modelId="{4CD037A6-1859-44BF-A97B-CF6D98E30C97}">
-      <dsp:nvSpPr>
-        <dsp:cNvPr id="0" name=""/>
-        <dsp:cNvSpPr/>
-      </dsp:nvSpPr>
-      <dsp:spPr>
-        <a:xfrm rot="17700000">
-          <a:off x="985608" y="330687"/>
-          <a:ext cx="857287" cy="413146"/>
-        </a:xfrm>
-        <a:prstGeom prst="rect">
-          <a:avLst/>
-        </a:prstGeom>
-        <a:noFill/>
-        <a:ln>
-          <a:noFill/>
-        </a:ln>
-        <a:effectLst/>
-      </dsp:spPr>
-      <dsp:style>
-        <a:lnRef idx="0">
-          <a:scrgbClr r="0" g="0" b="0"/>
-        </a:lnRef>
-        <a:fillRef idx="0">
-          <a:scrgbClr r="0" g="0" b="0"/>
-        </a:fillRef>
-        <a:effectRef idx="0">
-          <a:scrgbClr r="0" g="0" b="0"/>
-        </a:effectRef>
-        <a:fontRef idx="minor"/>
-      </dsp:style>
-      <dsp:txBody>
-        <a:bodyPr spcFirstLastPara="0" vert="horz" wrap="square" lIns="22860" tIns="0" rIns="0" bIns="0" numCol="1" spcCol="1270" anchor="ctr" anchorCtr="0">
-          <a:noAutofit/>
-        </a:bodyPr>
-        <a:lstStyle/>
-        <a:p>
-          <a:pPr lvl="0" algn="l" defTabSz="400050">
-            <a:lnSpc>
-              <a:spcPct val="90000"/>
-            </a:lnSpc>
-            <a:spcBef>
-              <a:spcPct val="0"/>
-            </a:spcBef>
-            <a:spcAft>
-              <a:spcPct val="35000"/>
-            </a:spcAft>
-          </a:pPr>
-          <a:r>
-            <a:rPr lang="fr-FR" sz="900" kern="1200" dirty="0"/>
-            <a:t>ES2-oct-1998</a:t>
-          </a:r>
-        </a:p>
-        <a:p>
-          <a:pPr lvl="0" algn="l" defTabSz="400050">
-            <a:lnSpc>
-              <a:spcPct val="90000"/>
-            </a:lnSpc>
-            <a:spcBef>
-              <a:spcPct val="0"/>
-            </a:spcBef>
-            <a:spcAft>
-              <a:spcPct val="35000"/>
-            </a:spcAft>
-          </a:pPr>
-          <a:endParaRPr lang="fr-FR" sz="900" kern="1200" dirty="0"/>
-        </a:p>
-      </dsp:txBody>
-      <dsp:txXfrm>
-        <a:off x="985608" y="330687"/>
-        <a:ext cx="857287" cy="413146"/>
-      </dsp:txXfrm>
-    </dsp:sp>
-    <dsp:sp modelId="{3FBE4088-F4D0-40B7-AE1D-DD8AFF0CB91B}">
-      <dsp:nvSpPr>
-        <dsp:cNvPr id="0" name=""/>
-        <dsp:cNvSpPr/>
-      </dsp:nvSpPr>
-      <dsp:spPr>
-        <a:xfrm>
-          <a:off x="1627922" y="1036554"/>
-          <a:ext cx="402275" cy="402275"/>
-        </a:xfrm>
-        <a:prstGeom prst="donut">
-          <a:avLst>
-            <a:gd name="adj" fmla="val 20000"/>
-          </a:avLst>
-        </a:prstGeom>
-        <a:solidFill>
-          <a:schemeClr val="accent1">
-            <a:hueOff val="0"/>
-            <a:satOff val="0"/>
-            <a:lumOff val="0"/>
-            <a:alphaOff val="0"/>
-          </a:schemeClr>
-        </a:solidFill>
-        <a:ln w="25400" cap="flat" cmpd="sng" algn="ctr">
-          <a:solidFill>
-            <a:schemeClr val="lt1">
-              <a:hueOff val="0"/>
-              <a:satOff val="0"/>
-              <a:lumOff val="0"/>
-              <a:alphaOff val="0"/>
-            </a:schemeClr>
-          </a:solidFill>
-          <a:prstDash val="solid"/>
-        </a:ln>
-        <a:effectLst/>
-      </dsp:spPr>
-      <dsp:style>
-        <a:lnRef idx="2">
-          <a:scrgbClr r="0" g="0" b="0"/>
-        </a:lnRef>
-        <a:fillRef idx="1">
-          <a:scrgbClr r="0" g="0" b="0"/>
-        </a:fillRef>
-        <a:effectRef idx="0">
-          <a:scrgbClr r="0" g="0" b="0"/>
-        </a:effectRef>
-        <a:fontRef idx="minor">
-          <a:schemeClr val="lt1"/>
-        </a:fontRef>
-      </dsp:style>
-    </dsp:sp>
-    <dsp:sp modelId="{0B669F0F-24DF-4F2E-BF58-582DE7A36AA5}">
-      <dsp:nvSpPr>
-        <dsp:cNvPr id="0" name=""/>
-        <dsp:cNvSpPr/>
-      </dsp:nvSpPr>
-      <dsp:spPr>
-        <a:xfrm rot="17700000">
-          <a:off x="1727239" y="330687"/>
-          <a:ext cx="857287" cy="413146"/>
-        </a:xfrm>
-        <a:prstGeom prst="rect">
-          <a:avLst/>
-        </a:prstGeom>
-        <a:noFill/>
-        <a:ln>
-          <a:noFill/>
-        </a:ln>
-        <a:effectLst/>
-      </dsp:spPr>
-      <dsp:style>
-        <a:lnRef idx="0">
-          <a:scrgbClr r="0" g="0" b="0"/>
-        </a:lnRef>
-        <a:fillRef idx="0">
-          <a:scrgbClr r="0" g="0" b="0"/>
-        </a:fillRef>
-        <a:effectRef idx="0">
-          <a:scrgbClr r="0" g="0" b="0"/>
-        </a:effectRef>
-        <a:fontRef idx="minor"/>
-      </dsp:style>
-      <dsp:txBody>
-        <a:bodyPr spcFirstLastPara="0" vert="horz" wrap="square" lIns="22860" tIns="0" rIns="0" bIns="0" numCol="1" spcCol="1270" anchor="ctr" anchorCtr="0">
-          <a:noAutofit/>
-        </a:bodyPr>
-        <a:lstStyle/>
-        <a:p>
-          <a:pPr lvl="0" algn="l" defTabSz="400050">
-            <a:lnSpc>
-              <a:spcPct val="90000"/>
-            </a:lnSpc>
-            <a:spcBef>
-              <a:spcPct val="0"/>
-            </a:spcBef>
-            <a:spcAft>
-              <a:spcPct val="35000"/>
-            </a:spcAft>
-          </a:pPr>
-          <a:r>
-            <a:rPr lang="fr-FR" sz="900" kern="1200" dirty="0"/>
-            <a:t>ES3-nov-2000</a:t>
-          </a:r>
-        </a:p>
-      </dsp:txBody>
-      <dsp:txXfrm>
-        <a:off x="1727239" y="330687"/>
-        <a:ext cx="857287" cy="413146"/>
-      </dsp:txXfrm>
-    </dsp:sp>
-    <dsp:sp modelId="{3268F5D7-03A4-404B-9070-27A2517220C4}">
-      <dsp:nvSpPr>
-        <dsp:cNvPr id="0" name=""/>
-        <dsp:cNvSpPr/>
-      </dsp:nvSpPr>
-      <dsp:spPr>
-        <a:xfrm>
-          <a:off x="2369553" y="1036554"/>
-          <a:ext cx="402275" cy="402275"/>
-        </a:xfrm>
-        <a:prstGeom prst="donut">
-          <a:avLst>
-            <a:gd name="adj" fmla="val 20000"/>
-          </a:avLst>
-        </a:prstGeom>
-        <a:solidFill>
-          <a:schemeClr val="accent1">
-            <a:hueOff val="0"/>
-            <a:satOff val="0"/>
-            <a:lumOff val="0"/>
-            <a:alphaOff val="0"/>
-          </a:schemeClr>
-        </a:solidFill>
-        <a:ln w="25400" cap="flat" cmpd="sng" algn="ctr">
-          <a:solidFill>
-            <a:schemeClr val="lt1">
-              <a:hueOff val="0"/>
-              <a:satOff val="0"/>
-              <a:lumOff val="0"/>
-              <a:alphaOff val="0"/>
-            </a:schemeClr>
-          </a:solidFill>
-          <a:prstDash val="solid"/>
-        </a:ln>
-        <a:effectLst/>
-      </dsp:spPr>
-      <dsp:style>
-        <a:lnRef idx="2">
-          <a:scrgbClr r="0" g="0" b="0"/>
-        </a:lnRef>
-        <a:fillRef idx="1">
-          <a:scrgbClr r="0" g="0" b="0"/>
-        </a:fillRef>
-        <a:effectRef idx="0">
-          <a:scrgbClr r="0" g="0" b="0"/>
-        </a:effectRef>
-        <a:fontRef idx="minor">
-          <a:schemeClr val="lt1"/>
-        </a:fontRef>
-      </dsp:style>
-    </dsp:sp>
-    <dsp:sp modelId="{E1B8D6AF-12E3-4B09-8E20-5FA28E8BDDE1}">
-      <dsp:nvSpPr>
-        <dsp:cNvPr id="0" name=""/>
-        <dsp:cNvSpPr/>
-      </dsp:nvSpPr>
-      <dsp:spPr>
-        <a:xfrm rot="17700000">
-          <a:off x="2468870" y="330687"/>
-          <a:ext cx="857287" cy="413146"/>
-        </a:xfrm>
-        <a:prstGeom prst="rect">
-          <a:avLst/>
-        </a:prstGeom>
-        <a:noFill/>
-        <a:ln>
-          <a:noFill/>
-        </a:ln>
-        <a:effectLst/>
-      </dsp:spPr>
-      <dsp:style>
-        <a:lnRef idx="0">
-          <a:scrgbClr r="0" g="0" b="0"/>
-        </a:lnRef>
-        <a:fillRef idx="0">
-          <a:scrgbClr r="0" g="0" b="0"/>
-        </a:fillRef>
-        <a:effectRef idx="0">
-          <a:scrgbClr r="0" g="0" b="0"/>
-        </a:effectRef>
-        <a:fontRef idx="minor"/>
-      </dsp:style>
-      <dsp:txBody>
-        <a:bodyPr spcFirstLastPara="0" vert="horz" wrap="square" lIns="22860" tIns="0" rIns="0" bIns="0" numCol="1" spcCol="1270" anchor="ctr" anchorCtr="0">
-          <a:noAutofit/>
-        </a:bodyPr>
-        <a:lstStyle/>
-        <a:p>
-          <a:pPr lvl="0" algn="l" defTabSz="400050">
-            <a:lnSpc>
-              <a:spcPct val="90000"/>
-            </a:lnSpc>
-            <a:spcBef>
-              <a:spcPct val="0"/>
-            </a:spcBef>
-            <a:spcAft>
-              <a:spcPct val="35000"/>
-            </a:spcAft>
-          </a:pPr>
-          <a:r>
-            <a:rPr lang="fr-FR" sz="900" kern="1200" dirty="0"/>
-            <a:t>ES5-dec-2009</a:t>
-          </a:r>
-        </a:p>
-      </dsp:txBody>
-      <dsp:txXfrm>
-        <a:off x="2468870" y="330687"/>
-        <a:ext cx="857287" cy="413146"/>
-      </dsp:txXfrm>
-    </dsp:sp>
-    <dsp:sp modelId="{BC335834-293B-496A-85EF-D0C322DE9E56}">
-      <dsp:nvSpPr>
-        <dsp:cNvPr id="0" name=""/>
-        <dsp:cNvSpPr/>
-      </dsp:nvSpPr>
-      <dsp:spPr>
-        <a:xfrm>
-          <a:off x="3111184" y="1036554"/>
-          <a:ext cx="402275" cy="402275"/>
-        </a:xfrm>
-        <a:prstGeom prst="donut">
-          <a:avLst>
-            <a:gd name="adj" fmla="val 20000"/>
-          </a:avLst>
-        </a:prstGeom>
-        <a:solidFill>
-          <a:schemeClr val="accent1">
-            <a:hueOff val="0"/>
-            <a:satOff val="0"/>
-            <a:lumOff val="0"/>
-            <a:alphaOff val="0"/>
-          </a:schemeClr>
-        </a:solidFill>
-        <a:ln w="25400" cap="flat" cmpd="sng" algn="ctr">
-          <a:solidFill>
-            <a:schemeClr val="lt1">
-              <a:hueOff val="0"/>
-              <a:satOff val="0"/>
-              <a:lumOff val="0"/>
-              <a:alphaOff val="0"/>
-            </a:schemeClr>
-          </a:solidFill>
-          <a:prstDash val="solid"/>
-        </a:ln>
-        <a:effectLst/>
-      </dsp:spPr>
-      <dsp:style>
-        <a:lnRef idx="2">
-          <a:scrgbClr r="0" g="0" b="0"/>
-        </a:lnRef>
-        <a:fillRef idx="1">
-          <a:scrgbClr r="0" g="0" b="0"/>
-        </a:fillRef>
-        <a:effectRef idx="0">
-          <a:scrgbClr r="0" g="0" b="0"/>
-        </a:effectRef>
-        <a:fontRef idx="minor">
-          <a:schemeClr val="lt1"/>
-        </a:fontRef>
-      </dsp:style>
-    </dsp:sp>
-    <dsp:sp modelId="{78D33A8E-1000-4DE5-9129-77C6B18F4185}">
-      <dsp:nvSpPr>
-        <dsp:cNvPr id="0" name=""/>
-        <dsp:cNvSpPr/>
-      </dsp:nvSpPr>
-      <dsp:spPr>
-        <a:xfrm rot="17700000">
-          <a:off x="3210501" y="330687"/>
-          <a:ext cx="857287" cy="413146"/>
-        </a:xfrm>
-        <a:prstGeom prst="rect">
-          <a:avLst/>
-        </a:prstGeom>
-        <a:noFill/>
-        <a:ln>
-          <a:noFill/>
-        </a:ln>
-        <a:effectLst/>
-      </dsp:spPr>
-      <dsp:style>
-        <a:lnRef idx="0">
-          <a:scrgbClr r="0" g="0" b="0"/>
-        </a:lnRef>
-        <a:fillRef idx="0">
-          <a:scrgbClr r="0" g="0" b="0"/>
-        </a:fillRef>
-        <a:effectRef idx="0">
-          <a:scrgbClr r="0" g="0" b="0"/>
-        </a:effectRef>
-        <a:fontRef idx="minor"/>
-      </dsp:style>
-      <dsp:txBody>
-        <a:bodyPr spcFirstLastPara="0" vert="horz" wrap="square" lIns="22860" tIns="0" rIns="0" bIns="0" numCol="1" spcCol="1270" anchor="ctr" anchorCtr="0">
-          <a:noAutofit/>
-        </a:bodyPr>
-        <a:lstStyle/>
-        <a:p>
-          <a:pPr lvl="0" algn="l" defTabSz="400050">
-            <a:lnSpc>
-              <a:spcPct val="90000"/>
-            </a:lnSpc>
-            <a:spcBef>
-              <a:spcPct val="0"/>
-            </a:spcBef>
-            <a:spcAft>
-              <a:spcPct val="35000"/>
-            </a:spcAft>
-          </a:pPr>
-          <a:r>
-            <a:rPr lang="fr-FR" sz="900" kern="1200" dirty="0"/>
-            <a:t>ES2015-juin-2015</a:t>
-          </a:r>
-          <a:br>
-            <a:rPr lang="fr-FR" sz="900" kern="1200" dirty="0"/>
-          </a:br>
-          <a:endParaRPr lang="fr-FR" sz="900" kern="1200" dirty="0"/>
-        </a:p>
-      </dsp:txBody>
-      <dsp:txXfrm>
-        <a:off x="3210501" y="330687"/>
-        <a:ext cx="857287" cy="413146"/>
-      </dsp:txXfrm>
-    </dsp:sp>
-    <dsp:sp modelId="{76A16D42-EE21-4CFD-ADBA-BE6659FAAE6D}">
-      <dsp:nvSpPr>
-        <dsp:cNvPr id="0" name=""/>
-        <dsp:cNvSpPr/>
-      </dsp:nvSpPr>
-      <dsp:spPr>
-        <a:xfrm>
-          <a:off x="3845108" y="1028847"/>
-          <a:ext cx="417688" cy="417688"/>
-        </a:xfrm>
-        <a:prstGeom prst="donut">
-          <a:avLst>
-            <a:gd name="adj" fmla="val 20000"/>
-          </a:avLst>
-        </a:prstGeom>
-        <a:solidFill>
-          <a:srgbClr val="CF022B">
-            <a:hueOff val="0"/>
-            <a:satOff val="0"/>
-            <a:lumOff val="0"/>
-            <a:alphaOff val="0"/>
-          </a:srgbClr>
-        </a:solidFill>
-        <a:ln w="25400" cap="flat" cmpd="sng" algn="ctr">
-          <a:solidFill>
-            <a:srgbClr val="FFFFFF">
-              <a:hueOff val="0"/>
-              <a:satOff val="0"/>
-              <a:lumOff val="0"/>
-              <a:alphaOff val="0"/>
-            </a:srgbClr>
-          </a:solidFill>
-          <a:prstDash val="solid"/>
-        </a:ln>
-        <a:effectLst/>
-      </dsp:spPr>
-      <dsp:style>
-        <a:lnRef idx="2">
-          <a:scrgbClr r="0" g="0" b="0"/>
-        </a:lnRef>
-        <a:fillRef idx="1">
-          <a:scrgbClr r="0" g="0" b="0"/>
-        </a:fillRef>
-        <a:effectRef idx="0">
-          <a:scrgbClr r="0" g="0" b="0"/>
-        </a:effectRef>
-        <a:fontRef idx="minor">
-          <a:schemeClr val="lt1"/>
-        </a:fontRef>
-      </dsp:style>
-    </dsp:sp>
-    <dsp:sp modelId="{8E793812-5747-44EC-AE3D-D44795798B1C}">
-      <dsp:nvSpPr>
-        <dsp:cNvPr id="0" name=""/>
-        <dsp:cNvSpPr/>
-      </dsp:nvSpPr>
-      <dsp:spPr>
-        <a:xfrm rot="17700000">
-          <a:off x="3952131" y="330687"/>
-          <a:ext cx="857287" cy="413146"/>
-        </a:xfrm>
-        <a:prstGeom prst="rect">
-          <a:avLst/>
-        </a:prstGeom>
-        <a:noFill/>
-        <a:ln>
-          <a:noFill/>
-        </a:ln>
-        <a:effectLst/>
-      </dsp:spPr>
-      <dsp:style>
-        <a:lnRef idx="0">
-          <a:scrgbClr r="0" g="0" b="0"/>
-        </a:lnRef>
-        <a:fillRef idx="0">
-          <a:scrgbClr r="0" g="0" b="0"/>
-        </a:fillRef>
-        <a:effectRef idx="0">
-          <a:scrgbClr r="0" g="0" b="0"/>
-        </a:effectRef>
-        <a:fontRef idx="minor"/>
-      </dsp:style>
-      <dsp:txBody>
-        <a:bodyPr spcFirstLastPara="0" vert="horz" wrap="square" lIns="22860" tIns="0" rIns="0" bIns="0" numCol="1" spcCol="1270" anchor="ctr" anchorCtr="0">
-          <a:noAutofit/>
-        </a:bodyPr>
-        <a:lstStyle/>
-        <a:p>
-          <a:pPr lvl="0" algn="l" defTabSz="400050">
-            <a:lnSpc>
-              <a:spcPct val="90000"/>
-            </a:lnSpc>
-            <a:spcBef>
-              <a:spcPct val="0"/>
-            </a:spcBef>
-            <a:spcAft>
-              <a:spcPct val="35000"/>
-            </a:spcAft>
-          </a:pPr>
-          <a:r>
-            <a:rPr lang="fr-FR" sz="900" kern="1200" dirty="0"/>
-            <a:t>ES2016-bientôt </a:t>
-          </a:r>
-          <a:br>
-            <a:rPr lang="fr-FR" sz="900" kern="1200" dirty="0"/>
-          </a:br>
-          <a:endParaRPr lang="fr-FR" sz="900" kern="1200" dirty="0"/>
-        </a:p>
-      </dsp:txBody>
-      <dsp:txXfrm>
-        <a:off x="3952131" y="330687"/>
-        <a:ext cx="857287" cy="413146"/>
-      </dsp:txXfrm>
-    </dsp:sp>
   </dsp:spTree>
 </dsp:drawing>
 </file>
@@ -16680,6 +15998,13 @@
               <a:rPr lang="fr-FR" altLang="fr-FR" dirty="0" smtClean="0"/>
               <a:t>Formulaires</a:t>
             </a:r>
+          </a:p>
+          <a:p>
+            <a:pPr lvl="1"/>
+            <a:r>
+              <a:rPr lang="fr-FR" altLang="fr-FR" sz="1800" smtClean="0"/>
+              <a:t>I18N</a:t>
+            </a:r>
             <a:endParaRPr lang="fr-FR" altLang="fr-FR" sz="1800" dirty="0" smtClean="0"/>
           </a:p>
         </p:txBody>

</xml_diff>